<commit_message>
Add table of contents. Correct the title of PCA plot
</commit_message>
<xml_diff>
--- a/Capstone_presentation_Laboratory Earthquake Prediction.pptx
+++ b/Capstone_presentation_Laboratory Earthquake Prediction.pptx
@@ -5,7 +5,7 @@
     <p:sldMasterId id="2147483648" r:id="rId1"/>
   </p:sldMasterIdLst>
   <p:notesMasterIdLst>
-    <p:notesMasterId r:id="rId21"/>
+    <p:notesMasterId r:id="rId22"/>
   </p:notesMasterIdLst>
   <p:sldIdLst>
     <p:sldId id="256" r:id="rId2"/>
@@ -23,10 +23,11 @@
     <p:sldId id="275" r:id="rId14"/>
     <p:sldId id="266" r:id="rId15"/>
     <p:sldId id="270" r:id="rId16"/>
-    <p:sldId id="271" r:id="rId17"/>
-    <p:sldId id="265" r:id="rId18"/>
-    <p:sldId id="268" r:id="rId19"/>
-    <p:sldId id="264" r:id="rId20"/>
+    <p:sldId id="276" r:id="rId17"/>
+    <p:sldId id="271" r:id="rId18"/>
+    <p:sldId id="265" r:id="rId19"/>
+    <p:sldId id="268" r:id="rId20"/>
+    <p:sldId id="264" r:id="rId21"/>
   </p:sldIdLst>
   <p:sldSz cx="12192000" cy="6858000"/>
   <p:notesSz cx="6858000" cy="9144000"/>
@@ -215,7 +216,7 @@
           <a:p>
             <a:fld id="{7FBEED9A-5CB8-4EF6-82CD-9891FBD08415}" type="datetimeFigureOut">
               <a:rPr lang="en-US" smtClean="0"/>
-              <a:t>10/4/2022</a:t>
+              <a:t>3/6/2023</a:t>
             </a:fld>
             <a:endParaRPr lang="en-US"/>
           </a:p>
@@ -526,155 +527,7 @@
           <a:bodyPr/>
           <a:lstStyle/>
           <a:p>
-            <a:pPr marL="228600" indent="-228600">
-              <a:buAutoNum type="arabicPeriod"/>
-            </a:pPr>
-            <a:r>
-              <a:rPr lang="en-US" dirty="0"/>
-              <a:t>Earthquake can cause severe damage. Geoscientists have been striving studying the earthquake physics and trying to predict when and how large a earthquake will occur. However, geologists society and earthquake scientists have never predicted a major earthquake. </a:t>
-            </a:r>
-          </a:p>
-          <a:p>
-            <a:pPr marL="228600" indent="-228600">
-              <a:buAutoNum type="arabicPeriod"/>
-            </a:pPr>
-            <a:r>
-              <a:rPr lang="en-US" dirty="0"/>
-              <a:t>Traditional methods generally look for trends or patterns that lead to </a:t>
-            </a:r>
-            <a:r>
-              <a:rPr lang="en-US" dirty="0" err="1"/>
-              <a:t>probablilistic</a:t>
-            </a:r>
-            <a:r>
-              <a:rPr lang="en-US" dirty="0"/>
-              <a:t> estimation of earthquake happening</a:t>
-            </a:r>
-          </a:p>
-          <a:p>
-            <a:r>
-              <a:rPr lang="en-US" b="0" i="0" dirty="0">
-                <a:solidFill>
-                  <a:srgbClr val="202122"/>
-                </a:solidFill>
-                <a:effectLst/>
-                <a:latin typeface="Arial" panose="020B0604020202020204" pitchFamily="34" charset="0"/>
-              </a:rPr>
-              <a:t>3. </a:t>
-            </a:r>
-            <a:r>
-              <a:rPr lang="en-US" b="0" i="0" dirty="0">
-                <a:solidFill>
-                  <a:srgbClr val="000000"/>
-                </a:solidFill>
-                <a:effectLst/>
-                <a:latin typeface="open sans" panose="020B0606030504020204" pitchFamily="34" charset="0"/>
-              </a:rPr>
-              <a:t>Discovered only in the last 20 years, slow earthquakes are still a seismic puzzle. This type of earthquake seems can be predicted</a:t>
-            </a:r>
-            <a:endParaRPr lang="en-US" b="0" i="0" dirty="0">
-              <a:solidFill>
-                <a:srgbClr val="202122"/>
-              </a:solidFill>
-              <a:effectLst/>
-              <a:latin typeface="Arial" panose="020B0604020202020204" pitchFamily="34" charset="0"/>
-            </a:endParaRPr>
-          </a:p>
-          <a:p>
-            <a:r>
-              <a:rPr lang="en-US" b="0" i="0" dirty="0">
-                <a:solidFill>
-                  <a:srgbClr val="202122"/>
-                </a:solidFill>
-                <a:effectLst/>
-                <a:latin typeface="Arial" panose="020B0604020202020204" pitchFamily="34" charset="0"/>
-              </a:rPr>
-              <a:t>A </a:t>
-            </a:r>
-            <a:r>
-              <a:rPr lang="en-US" b="1" i="0" dirty="0">
-                <a:solidFill>
-                  <a:srgbClr val="202122"/>
-                </a:solidFill>
-                <a:effectLst/>
-                <a:latin typeface="Arial" panose="020B0604020202020204" pitchFamily="34" charset="0"/>
-              </a:rPr>
-              <a:t>slow earthquake</a:t>
-            </a:r>
-            <a:r>
-              <a:rPr lang="en-US" b="0" i="0" dirty="0">
-                <a:solidFill>
-                  <a:srgbClr val="202122"/>
-                </a:solidFill>
-                <a:effectLst/>
-                <a:latin typeface="Arial" panose="020B0604020202020204" pitchFamily="34" charset="0"/>
-              </a:rPr>
-              <a:t> is a discontinuous, </a:t>
-            </a:r>
-            <a:r>
-              <a:rPr lang="en-US" b="0" i="0" u="none" strike="noStrike" dirty="0">
-                <a:solidFill>
-                  <a:srgbClr val="0645AD"/>
-                </a:solidFill>
-                <a:effectLst/>
-                <a:latin typeface="Arial" panose="020B0604020202020204" pitchFamily="34" charset="0"/>
-                <a:hlinkClick r:id="rId3" tooltip="Earthquake"/>
-              </a:rPr>
-              <a:t>earthquake</a:t>
-            </a:r>
-            <a:r>
-              <a:rPr lang="en-US" b="0" i="0" dirty="0">
-                <a:solidFill>
-                  <a:srgbClr val="202122"/>
-                </a:solidFill>
-                <a:effectLst/>
-                <a:latin typeface="Arial" panose="020B0604020202020204" pitchFamily="34" charset="0"/>
-              </a:rPr>
-              <a:t>-like event that releases energy over a period of hours to months, rather than the seconds to minutes characteristic of a typical earthquake.</a:t>
-            </a:r>
             <a:endParaRPr lang="en-US" dirty="0"/>
-          </a:p>
-          <a:p>
-            <a:r>
-              <a:rPr lang="en-US" b="0" i="0" dirty="0">
-                <a:solidFill>
-                  <a:srgbClr val="262626"/>
-                </a:solidFill>
-                <a:effectLst/>
-                <a:latin typeface="PT Serif" panose="020B0604020202020204" pitchFamily="18" charset="0"/>
-              </a:rPr>
-              <a:t>Slow earthquakes are characterized by a wide spectrum of fault slip behaviors and seismic radiation patterns that differ from those of traditional earthquakes. </a:t>
-            </a:r>
-            <a:r>
-              <a:rPr lang="en-US" b="0" i="0" dirty="0">
-                <a:solidFill>
-                  <a:srgbClr val="262626"/>
-                </a:solidFill>
-                <a:effectLst/>
-                <a:latin typeface="PT Serif" panose="020A0603040505020204" pitchFamily="18" charset="0"/>
-              </a:rPr>
-              <a:t>However, slow earthquakes and huge megathrust earthquakes can have common slip mechanisms and are located in neighboring regions of the </a:t>
-            </a:r>
-            <a:r>
-              <a:rPr lang="en-US" b="0" i="0" dirty="0" err="1">
-                <a:solidFill>
-                  <a:srgbClr val="262626"/>
-                </a:solidFill>
-                <a:effectLst/>
-                <a:latin typeface="PT Serif" panose="020A0603040505020204" pitchFamily="18" charset="0"/>
-              </a:rPr>
-              <a:t>seismogenic</a:t>
-            </a:r>
-            <a:r>
-              <a:rPr lang="en-US" b="0" i="0" dirty="0">
-                <a:solidFill>
-                  <a:srgbClr val="262626"/>
-                </a:solidFill>
-                <a:effectLst/>
-                <a:latin typeface="PT Serif" panose="020A0603040505020204" pitchFamily="18" charset="0"/>
-              </a:rPr>
-              <a:t> zone. The frequent occurrence of slow earthquakes may help to reveal the physics underlying megathrust events as useful analogs. Understanding the slow earthquakes helps to better predict the other earthquakes.</a:t>
-            </a:r>
           </a:p>
         </p:txBody>
       </p:sp>
@@ -695,7 +548,7 @@
           <a:p>
             <a:fld id="{D09B9B78-9CB7-4BB8-B8EA-7B060E3CCB98}" type="slidenum">
               <a:rPr lang="en-US" smtClean="0"/>
-              <a:t>2</a:t>
+              <a:t>1</a:t>
             </a:fld>
             <a:endParaRPr lang="en-US"/>
           </a:p>
@@ -704,7 +557,7 @@
     </p:spTree>
     <p:extLst>
       <p:ext uri="{BB962C8B-B14F-4D97-AF65-F5344CB8AC3E}">
-        <p14:creationId xmlns:p14="http://schemas.microsoft.com/office/powerpoint/2010/main" val="1568661478"/>
+        <p14:creationId xmlns:p14="http://schemas.microsoft.com/office/powerpoint/2010/main" val="4010564914"/>
       </p:ext>
     </p:extLst>
   </p:cSld>
@@ -776,268 +629,9 @@
               <a:defRPr/>
             </a:pPr>
             <a:r>
-              <a:rPr lang="en-US" b="1" i="0" dirty="0">
-                <a:solidFill>
-                  <a:srgbClr val="292929"/>
-                </a:solidFill>
-                <a:effectLst/>
-                <a:latin typeface="source-serif-pro"/>
-              </a:rPr>
-              <a:t>Bagging </a:t>
-            </a:r>
-            <a:r>
-              <a:rPr lang="en-US" b="0" i="0" dirty="0">
-                <a:solidFill>
-                  <a:srgbClr val="292929"/>
-                </a:solidFill>
-                <a:effectLst/>
-                <a:latin typeface="source-serif-pro"/>
-              </a:rPr>
-              <a:t>is a simple </a:t>
-            </a:r>
-            <a:r>
-              <a:rPr lang="en-US" b="0" i="0" dirty="0" err="1">
-                <a:solidFill>
-                  <a:srgbClr val="292929"/>
-                </a:solidFill>
-                <a:effectLst/>
-                <a:latin typeface="source-serif-pro"/>
-              </a:rPr>
-              <a:t>ensembling</a:t>
-            </a:r>
-            <a:r>
-              <a:rPr lang="en-US" b="0" i="0" dirty="0">
-                <a:solidFill>
-                  <a:srgbClr val="292929"/>
-                </a:solidFill>
-                <a:effectLst/>
-                <a:latin typeface="source-serif-pro"/>
-              </a:rPr>
-              <a:t> technique . </a:t>
-            </a:r>
-            <a:r>
-              <a:rPr lang="en-US" b="0" i="0" dirty="0">
-                <a:effectLst/>
-                <a:latin typeface="-apple-system"/>
-              </a:rPr>
-              <a:t>The Random Forest algorithm Generate bootstrap training samples and searches for the best feature among a random subset of features; </a:t>
-            </a:r>
-            <a:r>
-              <a:rPr lang="en-US" b="0" i="0" dirty="0">
-                <a:solidFill>
-                  <a:srgbClr val="292929"/>
-                </a:solidFill>
-                <a:effectLst/>
-                <a:latin typeface="source-serif-pro"/>
-              </a:rPr>
-              <a:t>Resample the data or features to train many tree models. Use model averaging, such as majority vote or </a:t>
-            </a:r>
-            <a:r>
-              <a:rPr lang="en-US" b="0" i="0" dirty="0" err="1">
-                <a:solidFill>
-                  <a:srgbClr val="292929"/>
-                </a:solidFill>
-                <a:effectLst/>
-                <a:latin typeface="source-serif-pro"/>
-              </a:rPr>
-              <a:t>nomal</a:t>
-            </a:r>
-            <a:r>
-              <a:rPr lang="en-US" b="0" i="0" dirty="0">
-                <a:solidFill>
-                  <a:srgbClr val="292929"/>
-                </a:solidFill>
-                <a:effectLst/>
-                <a:latin typeface="source-serif-pro"/>
-              </a:rPr>
-              <a:t> average. </a:t>
-            </a:r>
-            <a:r>
-              <a:rPr lang="en-US" b="0" i="0" dirty="0">
-                <a:effectLst/>
-                <a:latin typeface="-apple-system"/>
-              </a:rPr>
-              <a:t>This results in a greater tree diversity, which (once again) trades </a:t>
-            </a:r>
-            <a:r>
-              <a:rPr lang="en-US" b="1" i="0" dirty="0">
-                <a:effectLst/>
-                <a:latin typeface="-apple-system"/>
-              </a:rPr>
-              <a:t>a higher bias for a lower variance</a:t>
-            </a:r>
-            <a:r>
-              <a:rPr lang="en-US" b="0" i="0" dirty="0">
-                <a:effectLst/>
-                <a:latin typeface="-apple-system"/>
-              </a:rPr>
-              <a:t>, generally yielding an overall better model.</a:t>
-            </a:r>
-          </a:p>
-          <a:p>
-            <a:r>
-              <a:rPr lang="en-US" b="0" i="0" dirty="0">
-                <a:effectLst/>
-                <a:latin typeface="-apple-system"/>
-              </a:rPr>
-              <a:t>The popularity of random forest is primarily due to how well it performs in a multitude of data situations. It tends to handle highly correlated features well, where as a linear regression model would not. </a:t>
-            </a:r>
-          </a:p>
-          <a:p>
-            <a:r>
-              <a:rPr lang="en-US" b="0" i="0" dirty="0">
-                <a:solidFill>
-                  <a:srgbClr val="292929"/>
-                </a:solidFill>
-                <a:effectLst/>
-                <a:latin typeface="source-serif-pro"/>
-              </a:rPr>
-              <a:t> </a:t>
-            </a:r>
-            <a:endParaRPr lang="en-US" b="0" i="0" dirty="0">
-              <a:solidFill>
-                <a:srgbClr val="000000"/>
-              </a:solidFill>
-              <a:effectLst/>
-              <a:latin typeface="Roboto" panose="02000000000000000000" pitchFamily="2" charset="0"/>
-            </a:endParaRPr>
-          </a:p>
-          <a:p>
-            <a:r>
-              <a:rPr lang="en-US" b="0" i="0" dirty="0">
-                <a:solidFill>
-                  <a:srgbClr val="000000"/>
-                </a:solidFill>
-                <a:effectLst/>
-                <a:latin typeface="Roboto" panose="02000000000000000000" pitchFamily="2" charset="0"/>
-              </a:rPr>
-              <a:t>'Boosting' is the term for an ensemble method in which new models replace incorrect predecessors until no further improvements can be made. Gradient boosting, on the other hand, is a technique that makes new models to predict the error of previous ones, before collating the results for an ultimate prediction.</a:t>
-            </a:r>
-          </a:p>
-          <a:p>
-            <a:r>
-              <a:rPr lang="en-US" b="0" i="0" dirty="0">
-                <a:effectLst/>
-                <a:latin typeface="-apple-system"/>
-              </a:rPr>
-              <a:t>Gradient boosting: Each time we run a decision tree, we extract the residuals. Then we run a new decision tree, using those residuals as the outcome to be predicted. After reaching a stopping point, we add together the predicted values from all of the decision trees to create the final gradient boosted prediction.</a:t>
-            </a:r>
-          </a:p>
-          <a:p>
-            <a:pPr algn="l"/>
-            <a:r>
-              <a:rPr lang="en-US" b="1" i="0" u="none" strike="noStrike" dirty="0" err="1">
-                <a:effectLst/>
-                <a:latin typeface="-apple-system"/>
-                <a:hlinkClick r:id="rId3"/>
-              </a:rPr>
-              <a:t>LightGBM</a:t>
-            </a:r>
-            <a:r>
-              <a:rPr lang="en-US" b="1" i="0" dirty="0">
-                <a:effectLst/>
-                <a:latin typeface="-apple-system"/>
-              </a:rPr>
-              <a:t> is a gradient boosting framework that uses tree-based learning algorithms. It is designed to be distributed and efficient with the following advantages:</a:t>
-            </a:r>
-          </a:p>
-          <a:p>
-            <a:pPr algn="l">
-              <a:buFont typeface="Arial" panose="020B0604020202020204" pitchFamily="34" charset="0"/>
-              <a:buChar char="•"/>
-            </a:pPr>
-            <a:r>
-              <a:rPr lang="en-US" b="0" i="0" dirty="0">
-                <a:effectLst/>
-                <a:latin typeface="-apple-system"/>
-              </a:rPr>
-              <a:t>Faster training speed and higher efficiency.</a:t>
-            </a:r>
-          </a:p>
-          <a:p>
-            <a:pPr algn="l">
-              <a:buFont typeface="Arial" panose="020B0604020202020204" pitchFamily="34" charset="0"/>
-              <a:buChar char="•"/>
-            </a:pPr>
-            <a:r>
-              <a:rPr lang="en-US" b="0" i="0" dirty="0">
-                <a:effectLst/>
-                <a:latin typeface="-apple-system"/>
-              </a:rPr>
-              <a:t>Lower memory usage.</a:t>
-            </a:r>
-          </a:p>
-          <a:p>
-            <a:pPr algn="l">
-              <a:buFont typeface="Arial" panose="020B0604020202020204" pitchFamily="34" charset="0"/>
-              <a:buChar char="•"/>
-            </a:pPr>
-            <a:r>
-              <a:rPr lang="en-US" b="0" i="0" dirty="0">
-                <a:effectLst/>
-                <a:latin typeface="-apple-system"/>
-              </a:rPr>
-              <a:t>Better accuracy.</a:t>
-            </a:r>
-          </a:p>
-          <a:p>
-            <a:pPr algn="l">
-              <a:buFont typeface="Arial" panose="020B0604020202020204" pitchFamily="34" charset="0"/>
-              <a:buChar char="•"/>
-            </a:pPr>
-            <a:r>
-              <a:rPr lang="en-US" b="0" i="0" dirty="0">
-                <a:effectLst/>
-                <a:latin typeface="-apple-system"/>
-              </a:rPr>
-              <a:t>Support of parallel and GPU learning.</a:t>
-            </a:r>
-          </a:p>
-          <a:p>
-            <a:pPr algn="l">
-              <a:buFont typeface="Arial" panose="020B0604020202020204" pitchFamily="34" charset="0"/>
-              <a:buChar char="•"/>
-            </a:pPr>
-            <a:r>
-              <a:rPr lang="en-US" b="0" i="0" dirty="0">
-                <a:effectLst/>
-                <a:latin typeface="-apple-system"/>
-              </a:rPr>
-              <a:t>Capable of handling large-scale data.</a:t>
-            </a:r>
-          </a:p>
-          <a:p>
-            <a:pPr algn="l">
-              <a:buFont typeface="Arial" panose="020B0604020202020204" pitchFamily="34" charset="0"/>
-              <a:buNone/>
-            </a:pPr>
-            <a:endParaRPr lang="en-US" b="0" i="0" dirty="0">
-              <a:effectLst/>
-              <a:latin typeface="-apple-system"/>
-            </a:endParaRPr>
-          </a:p>
-          <a:p>
-            <a:r>
               <a:rPr lang="en-US" dirty="0"/>
-              <a:t>Tree based models</a:t>
-            </a:r>
-          </a:p>
-          <a:p>
-            <a:pPr lvl="1"/>
-            <a:r>
-              <a:rPr lang="en-US" dirty="0"/>
-              <a:t>Decision Trees: Fast to train (using only one feature at a time), intuitive, interpretable</a:t>
-            </a:r>
-          </a:p>
-          <a:p>
-            <a:pPr algn="l">
-              <a:buFont typeface="Arial" panose="020B0604020202020204" pitchFamily="34" charset="0"/>
-              <a:buNone/>
-            </a:pPr>
-            <a:endParaRPr lang="en-US" b="0" i="0" dirty="0">
-              <a:effectLst/>
-              <a:latin typeface="-apple-system"/>
-            </a:endParaRPr>
+              <a:t>Correlation between a single feature and the label ranges from –0.6 to 0.6</a:t>
+            </a:r>
           </a:p>
           <a:p>
             <a:endParaRPr lang="en-US" dirty="0"/>
@@ -1061,7 +655,7 @@
           <a:p>
             <a:fld id="{D09B9B78-9CB7-4BB8-B8EA-7B060E3CCB98}" type="slidenum">
               <a:rPr lang="en-US" smtClean="0"/>
-              <a:t>11</a:t>
+              <a:t>10</a:t>
             </a:fld>
             <a:endParaRPr lang="en-US"/>
           </a:p>
@@ -1070,7 +664,7 @@
     </p:spTree>
     <p:extLst>
       <p:ext uri="{BB962C8B-B14F-4D97-AF65-F5344CB8AC3E}">
-        <p14:creationId xmlns:p14="http://schemas.microsoft.com/office/powerpoint/2010/main" val="207163681"/>
+        <p14:creationId xmlns:p14="http://schemas.microsoft.com/office/powerpoint/2010/main" val="1546233132"/>
       </p:ext>
     </p:extLst>
   </p:cSld>
@@ -1124,14 +718,288 @@
           <a:bodyPr/>
           <a:lstStyle/>
           <a:p>
+            <a:pPr marL="0" marR="0" lvl="0" indent="0" algn="l" defTabSz="914400" rtl="0" eaLnBrk="1" fontAlgn="auto" latinLnBrk="0" hangingPunct="1">
+              <a:lnSpc>
+                <a:spcPct val="100000"/>
+              </a:lnSpc>
+              <a:spcBef>
+                <a:spcPts val="0"/>
+              </a:spcBef>
+              <a:spcAft>
+                <a:spcPts val="0"/>
+              </a:spcAft>
+              <a:buClrTx/>
+              <a:buSzTx/>
+              <a:buFontTx/>
+              <a:buNone/>
+              <a:tabLst/>
+              <a:defRPr/>
+            </a:pPr>
+            <a:r>
+              <a:rPr lang="en-US" b="1" i="0" dirty="0">
+                <a:solidFill>
+                  <a:srgbClr val="292929"/>
+                </a:solidFill>
+                <a:effectLst/>
+                <a:latin typeface="source-serif-pro"/>
+              </a:rPr>
+              <a:t>Bagging </a:t>
+            </a:r>
+            <a:r>
+              <a:rPr lang="en-US" b="0" i="0" dirty="0">
+                <a:solidFill>
+                  <a:srgbClr val="292929"/>
+                </a:solidFill>
+                <a:effectLst/>
+                <a:latin typeface="source-serif-pro"/>
+              </a:rPr>
+              <a:t>is a simple </a:t>
+            </a:r>
+            <a:r>
+              <a:rPr lang="en-US" b="0" i="0" dirty="0" err="1">
+                <a:solidFill>
+                  <a:srgbClr val="292929"/>
+                </a:solidFill>
+                <a:effectLst/>
+                <a:latin typeface="source-serif-pro"/>
+              </a:rPr>
+              <a:t>ensembling</a:t>
+            </a:r>
+            <a:r>
+              <a:rPr lang="en-US" b="0" i="0" dirty="0">
+                <a:solidFill>
+                  <a:srgbClr val="292929"/>
+                </a:solidFill>
+                <a:effectLst/>
+                <a:latin typeface="source-serif-pro"/>
+              </a:rPr>
+              <a:t> technique . </a:t>
+            </a:r>
+            <a:r>
+              <a:rPr lang="en-US" b="0" i="0" dirty="0">
+                <a:effectLst/>
+                <a:latin typeface="-apple-system"/>
+              </a:rPr>
+              <a:t>The Random Forest algorithm Generate bootstrap training samples and searches for the best feature among a random subset of features; </a:t>
+            </a:r>
+            <a:r>
+              <a:rPr lang="en-US" b="0" i="0" dirty="0">
+                <a:solidFill>
+                  <a:srgbClr val="292929"/>
+                </a:solidFill>
+                <a:effectLst/>
+                <a:latin typeface="source-serif-pro"/>
+              </a:rPr>
+              <a:t>Resample the data or features to train many tree models. Use model averaging, such as majority vote or </a:t>
+            </a:r>
+            <a:r>
+              <a:rPr lang="en-US" b="0" i="0" dirty="0" err="1">
+                <a:solidFill>
+                  <a:srgbClr val="292929"/>
+                </a:solidFill>
+                <a:effectLst/>
+                <a:latin typeface="source-serif-pro"/>
+              </a:rPr>
+              <a:t>nomal</a:t>
+            </a:r>
+            <a:r>
+              <a:rPr lang="en-US" b="0" i="0" dirty="0">
+                <a:solidFill>
+                  <a:srgbClr val="292929"/>
+                </a:solidFill>
+                <a:effectLst/>
+                <a:latin typeface="source-serif-pro"/>
+              </a:rPr>
+              <a:t> average. </a:t>
+            </a:r>
+            <a:r>
+              <a:rPr lang="en-US" b="0" i="0" dirty="0">
+                <a:effectLst/>
+                <a:latin typeface="-apple-system"/>
+              </a:rPr>
+              <a:t>This results in a greater tree diversity, which (once again) trades </a:t>
+            </a:r>
+            <a:r>
+              <a:rPr lang="en-US" b="1" i="0" dirty="0">
+                <a:effectLst/>
+                <a:latin typeface="-apple-system"/>
+              </a:rPr>
+              <a:t>a higher bias for a lower variance</a:t>
+            </a:r>
+            <a:r>
+              <a:rPr lang="en-US" b="0" i="0" dirty="0">
+                <a:effectLst/>
+                <a:latin typeface="-apple-system"/>
+              </a:rPr>
+              <a:t>, generally yielding an overall better model.</a:t>
+            </a:r>
+          </a:p>
+          <a:p>
+            <a:r>
+              <a:rPr lang="en-US" b="0" i="0" dirty="0">
+                <a:effectLst/>
+                <a:latin typeface="-apple-system"/>
+              </a:rPr>
+              <a:t>The popularity of random forest is primarily due to how well it performs in a multitude of data situations. It tends to handle highly correlated features well, where as a linear regression model would not. </a:t>
+            </a:r>
+          </a:p>
+          <a:p>
+            <a:r>
+              <a:rPr lang="en-US" b="0" i="0" dirty="0">
+                <a:solidFill>
+                  <a:srgbClr val="292929"/>
+                </a:solidFill>
+                <a:effectLst/>
+                <a:latin typeface="source-serif-pro"/>
+              </a:rPr>
+              <a:t> </a:t>
+            </a:r>
+            <a:endParaRPr lang="en-US" b="0" i="0" u="sng" dirty="0">
+              <a:solidFill>
+                <a:srgbClr val="000000"/>
+              </a:solidFill>
+              <a:effectLst/>
+              <a:latin typeface="Roboto" panose="02000000000000000000" pitchFamily="2" charset="0"/>
+            </a:endParaRPr>
+          </a:p>
+          <a:p>
+            <a:r>
+              <a:rPr lang="en-US" b="0" i="0" u="sng" dirty="0">
+                <a:solidFill>
+                  <a:srgbClr val="000000"/>
+                </a:solidFill>
+                <a:effectLst/>
+                <a:latin typeface="Roboto" panose="02000000000000000000" pitchFamily="2" charset="0"/>
+              </a:rPr>
+              <a:t>'Boosting' is the term for an ensemble method in which new models replace incorrect predecessors until no further improvements can be made. Gradient boosting, on the other hand, is a technique that makes new models to predict the error of previous ones, before collating the results for an ultimate prediction.</a:t>
+            </a:r>
+          </a:p>
+          <a:p>
+            <a:r>
+              <a:rPr lang="en-US" b="0" i="0" dirty="0">
+                <a:effectLst/>
+                <a:latin typeface="-apple-system"/>
+              </a:rPr>
+              <a:t>Gradient boosting: Each time we run a decision tree, we extract the residuals. Then we run a new decision tree, using those residuals as the outcome to be predicted. After reaching a stopping point, we add together the predicted values from all of the decision trees to create the final gradient boosted prediction.</a:t>
+            </a:r>
+          </a:p>
+          <a:p>
+            <a:pPr algn="l"/>
+            <a:r>
+              <a:rPr lang="en-US" b="1" i="0" u="none" strike="noStrike" dirty="0" err="1">
+                <a:effectLst/>
+                <a:latin typeface="-apple-system"/>
+                <a:hlinkClick r:id="rId3"/>
+              </a:rPr>
+              <a:t>LightGBM</a:t>
+            </a:r>
+            <a:r>
+              <a:rPr lang="en-US" b="1" i="0" dirty="0">
+                <a:effectLst/>
+                <a:latin typeface="-apple-system"/>
+              </a:rPr>
+              <a:t> is a gradient boosting framework that uses tree-based learning algorithms. It is designed to be distributed and efficient with the following advantages:</a:t>
+            </a:r>
+          </a:p>
+          <a:p>
+            <a:pPr algn="l">
+              <a:buFont typeface="Arial" panose="020B0604020202020204" pitchFamily="34" charset="0"/>
+              <a:buChar char="•"/>
+            </a:pPr>
+            <a:r>
+              <a:rPr lang="en-US" b="0" i="0" dirty="0">
+                <a:effectLst/>
+                <a:latin typeface="-apple-system"/>
+              </a:rPr>
+              <a:t>Faster training speed and higher efficiency.</a:t>
+            </a:r>
+          </a:p>
+          <a:p>
+            <a:pPr algn="l">
+              <a:buFont typeface="Arial" panose="020B0604020202020204" pitchFamily="34" charset="0"/>
+              <a:buChar char="•"/>
+            </a:pPr>
+            <a:r>
+              <a:rPr lang="en-US" b="0" i="0" dirty="0">
+                <a:effectLst/>
+                <a:latin typeface="-apple-system"/>
+              </a:rPr>
+              <a:t>Lower memory usage.</a:t>
+            </a:r>
+          </a:p>
+          <a:p>
+            <a:pPr algn="l">
+              <a:buFont typeface="Arial" panose="020B0604020202020204" pitchFamily="34" charset="0"/>
+              <a:buChar char="•"/>
+            </a:pPr>
+            <a:r>
+              <a:rPr lang="en-US" b="0" i="0" dirty="0">
+                <a:effectLst/>
+                <a:latin typeface="-apple-system"/>
+              </a:rPr>
+              <a:t>Better accuracy.</a:t>
+            </a:r>
+          </a:p>
+          <a:p>
+            <a:pPr algn="l">
+              <a:buFont typeface="Arial" panose="020B0604020202020204" pitchFamily="34" charset="0"/>
+              <a:buChar char="•"/>
+            </a:pPr>
+            <a:r>
+              <a:rPr lang="en-US" b="0" i="0" dirty="0">
+                <a:effectLst/>
+                <a:latin typeface="-apple-system"/>
+              </a:rPr>
+              <a:t>Support of parallel and GPU learning.</a:t>
+            </a:r>
+          </a:p>
+          <a:p>
+            <a:pPr algn="l">
+              <a:buFont typeface="Arial" panose="020B0604020202020204" pitchFamily="34" charset="0"/>
+              <a:buChar char="•"/>
+            </a:pPr>
+            <a:r>
+              <a:rPr lang="en-US" b="0" i="0" dirty="0">
+                <a:effectLst/>
+                <a:latin typeface="-apple-system"/>
+              </a:rPr>
+              <a:t>Capable of handling large-scale data.</a:t>
+            </a:r>
+          </a:p>
+          <a:p>
+            <a:pPr algn="l">
+              <a:buFont typeface="Arial" panose="020B0604020202020204" pitchFamily="34" charset="0"/>
+              <a:buNone/>
+            </a:pPr>
+            <a:endParaRPr lang="en-US" b="0" i="0" dirty="0">
+              <a:effectLst/>
+              <a:latin typeface="-apple-system"/>
+            </a:endParaRPr>
+          </a:p>
+          <a:p>
             <a:r>
               <a:rPr lang="en-US" dirty="0"/>
-              <a:t>Tuned </a:t>
-            </a:r>
-            <a:r>
-              <a:rPr lang="en-US" dirty="0" err="1"/>
-              <a:t>lightgbm</a:t>
-            </a:r>
+              <a:t>Tree based models</a:t>
+            </a:r>
+          </a:p>
+          <a:p>
+            <a:pPr lvl="1"/>
+            <a:r>
+              <a:rPr lang="en-US" dirty="0"/>
+              <a:t>Decision Trees: Fast to train (using only one feature at a time), intuitive, interpretable</a:t>
+            </a:r>
+          </a:p>
+          <a:p>
+            <a:pPr algn="l">
+              <a:buFont typeface="Arial" panose="020B0604020202020204" pitchFamily="34" charset="0"/>
+              <a:buNone/>
+            </a:pPr>
+            <a:endParaRPr lang="en-US" b="0" i="0" dirty="0">
+              <a:effectLst/>
+              <a:latin typeface="-apple-system"/>
+            </a:endParaRPr>
+          </a:p>
+          <a:p>
             <a:endParaRPr lang="en-US" dirty="0"/>
           </a:p>
         </p:txBody>
@@ -1153,7 +1021,7 @@
           <a:p>
             <a:fld id="{D09B9B78-9CB7-4BB8-B8EA-7B060E3CCB98}" type="slidenum">
               <a:rPr lang="en-US" smtClean="0"/>
-              <a:t>12</a:t>
+              <a:t>11</a:t>
             </a:fld>
             <a:endParaRPr lang="en-US"/>
           </a:p>
@@ -1162,7 +1030,7 @@
     </p:spTree>
     <p:extLst>
       <p:ext uri="{BB962C8B-B14F-4D97-AF65-F5344CB8AC3E}">
-        <p14:creationId xmlns:p14="http://schemas.microsoft.com/office/powerpoint/2010/main" val="2229974345"/>
+        <p14:creationId xmlns:p14="http://schemas.microsoft.com/office/powerpoint/2010/main" val="207163681"/>
       </p:ext>
     </p:extLst>
   </p:cSld>
@@ -1217,6 +1085,98 @@
           <a:lstStyle/>
           <a:p>
             <a:r>
+              <a:rPr lang="en-US" dirty="0"/>
+              <a:t>Tuned </a:t>
+            </a:r>
+            <a:r>
+              <a:rPr lang="en-US" dirty="0" err="1"/>
+              <a:t>lightgbm</a:t>
+            </a:r>
+            <a:endParaRPr lang="en-US" dirty="0"/>
+          </a:p>
+        </p:txBody>
+      </p:sp>
+      <p:sp>
+        <p:nvSpPr>
+          <p:cNvPr id="4" name="Slide Number Placeholder 3"/>
+          <p:cNvSpPr>
+            <a:spLocks noGrp="1"/>
+          </p:cNvSpPr>
+          <p:nvPr>
+            <p:ph type="sldNum" sz="quarter" idx="5"/>
+          </p:nvPr>
+        </p:nvSpPr>
+        <p:spPr/>
+        <p:txBody>
+          <a:bodyPr/>
+          <a:lstStyle/>
+          <a:p>
+            <a:fld id="{D09B9B78-9CB7-4BB8-B8EA-7B060E3CCB98}" type="slidenum">
+              <a:rPr lang="en-US" smtClean="0"/>
+              <a:t>12</a:t>
+            </a:fld>
+            <a:endParaRPr lang="en-US"/>
+          </a:p>
+        </p:txBody>
+      </p:sp>
+    </p:spTree>
+    <p:extLst>
+      <p:ext uri="{BB962C8B-B14F-4D97-AF65-F5344CB8AC3E}">
+        <p14:creationId xmlns:p14="http://schemas.microsoft.com/office/powerpoint/2010/main" val="2229974345"/>
+      </p:ext>
+    </p:extLst>
+  </p:cSld>
+  <p:clrMapOvr>
+    <a:masterClrMapping/>
+  </p:clrMapOvr>
+</p:notes>
+</file>
+
+<file path=ppt/notesSlides/notesSlide13.xml><?xml version="1.0" encoding="utf-8"?>
+<p:notes xmlns:a="http://schemas.openxmlformats.org/drawingml/2006/main" xmlns:r="http://schemas.openxmlformats.org/officeDocument/2006/relationships" xmlns:p="http://schemas.openxmlformats.org/presentationml/2006/main">
+  <p:cSld>
+    <p:spTree>
+      <p:nvGrpSpPr>
+        <p:cNvPr id="1" name=""/>
+        <p:cNvGrpSpPr/>
+        <p:nvPr/>
+      </p:nvGrpSpPr>
+      <p:grpSpPr>
+        <a:xfrm>
+          <a:off x="0" y="0"/>
+          <a:ext cx="0" cy="0"/>
+          <a:chOff x="0" y="0"/>
+          <a:chExt cx="0" cy="0"/>
+        </a:xfrm>
+      </p:grpSpPr>
+      <p:sp>
+        <p:nvSpPr>
+          <p:cNvPr id="2" name="Slide Image Placeholder 1"/>
+          <p:cNvSpPr>
+            <a:spLocks noGrp="1" noRot="1" noChangeAspect="1"/>
+          </p:cNvSpPr>
+          <p:nvPr>
+            <p:ph type="sldImg"/>
+          </p:nvPr>
+        </p:nvSpPr>
+        <p:spPr/>
+      </p:sp>
+      <p:sp>
+        <p:nvSpPr>
+          <p:cNvPr id="3" name="Notes Placeholder 2"/>
+          <p:cNvSpPr>
+            <a:spLocks noGrp="1"/>
+          </p:cNvSpPr>
+          <p:nvPr>
+            <p:ph type="body" idx="1"/>
+          </p:nvPr>
+        </p:nvSpPr>
+        <p:spPr/>
+        <p:txBody>
+          <a:bodyPr/>
+          <a:lstStyle/>
+          <a:p>
+            <a:r>
               <a:rPr lang="en-US" b="0" i="0" dirty="0">
                 <a:solidFill>
                   <a:srgbClr val="212529"/>
@@ -1266,7 +1226,7 @@
 </p:notes>
 </file>
 
-<file path=ppt/notesSlides/notesSlide13.xml><?xml version="1.0" encoding="utf-8"?>
+<file path=ppt/notesSlides/notesSlide14.xml><?xml version="1.0" encoding="utf-8"?>
 <p:notes xmlns:a="http://schemas.openxmlformats.org/drawingml/2006/main" xmlns:r="http://schemas.openxmlformats.org/officeDocument/2006/relationships" xmlns:p="http://schemas.openxmlformats.org/presentationml/2006/main">
   <p:cSld>
     <p:spTree>
@@ -1397,6 +1357,42 @@
           <a:bodyPr/>
           <a:lstStyle/>
           <a:p>
+            <a:pPr marL="228600" indent="-228600">
+              <a:buAutoNum type="arabicPeriod"/>
+            </a:pPr>
+            <a:r>
+              <a:rPr lang="en-US" dirty="0"/>
+              <a:t>Earthquake can cause severe damage. Geoscientists have been striving studying the earthquake physics and trying to predict when and how large of an earthquake. However, geologists society and earthquake scientists have never predicted a major earthquake. </a:t>
+            </a:r>
+          </a:p>
+          <a:p>
+            <a:pPr marL="228600" indent="-228600">
+              <a:buAutoNum type="arabicPeriod"/>
+            </a:pPr>
+            <a:r>
+              <a:rPr lang="en-US" dirty="0"/>
+              <a:t>Traditional methods generally look for trends or patterns that lead to </a:t>
+            </a:r>
+            <a:r>
+              <a:rPr lang="en-US" dirty="0" err="1"/>
+              <a:t>probablilistic</a:t>
+            </a:r>
+            <a:r>
+              <a:rPr lang="en-US" dirty="0"/>
+              <a:t> estimation of earthquake happening</a:t>
+            </a:r>
+          </a:p>
+          <a:p>
+            <a:r>
+              <a:rPr lang="en-US" b="0" i="0" dirty="0">
+                <a:solidFill>
+                  <a:srgbClr val="202122"/>
+                </a:solidFill>
+                <a:effectLst/>
+                <a:latin typeface="Arial" panose="020B0604020202020204" pitchFamily="34" charset="0"/>
+              </a:rPr>
+              <a:t>3. </a:t>
+            </a:r>
             <a:r>
               <a:rPr lang="en-US" b="0" i="0" dirty="0">
                 <a:solidFill>
@@ -1405,21 +1401,111 @@
                 <a:effectLst/>
                 <a:latin typeface="open sans" panose="020B0606030504020204" pitchFamily="34" charset="0"/>
               </a:rPr>
-              <a:t>two quieter earthquakes began slowly creeping along the Japan Trench toward the point where the massive, megathrust quake would erupt a month later.</a:t>
-            </a:r>
+              <a:t>Discovered only in the last 20 years, slow earthquakes are still a seismic puzzle. This type of earthquake seems can be predicted</a:t>
+            </a:r>
+            <a:endParaRPr lang="en-US" b="0" i="0" dirty="0">
+              <a:solidFill>
+                <a:srgbClr val="202122"/>
+              </a:solidFill>
+              <a:effectLst/>
+              <a:latin typeface="Arial" panose="020B0604020202020204" pitchFamily="34" charset="0"/>
+            </a:endParaRPr>
           </a:p>
           <a:p>
             <a:r>
               <a:rPr lang="en-US" b="0" i="0" dirty="0">
                 <a:solidFill>
-                  <a:srgbClr val="000000"/>
+                  <a:srgbClr val="202122"/>
                 </a:solidFill>
                 <a:effectLst/>
-                <a:latin typeface="open sans" panose="020B0606030504020204" pitchFamily="34" charset="0"/>
+                <a:latin typeface="Arial" panose="020B0604020202020204" pitchFamily="34" charset="0"/>
               </a:rPr>
-              <a:t>Image how many people’s lives and economic lost can be saved?</a:t>
+              <a:t>A </a:t>
+            </a:r>
+            <a:r>
+              <a:rPr lang="en-US" b="1" i="0" dirty="0">
+                <a:solidFill>
+                  <a:srgbClr val="202122"/>
+                </a:solidFill>
+                <a:effectLst/>
+                <a:latin typeface="Arial" panose="020B0604020202020204" pitchFamily="34" charset="0"/>
+              </a:rPr>
+              <a:t>slow earthquake</a:t>
+            </a:r>
+            <a:r>
+              <a:rPr lang="en-US" b="0" i="0" dirty="0">
+                <a:solidFill>
+                  <a:srgbClr val="202122"/>
+                </a:solidFill>
+                <a:effectLst/>
+                <a:latin typeface="Arial" panose="020B0604020202020204" pitchFamily="34" charset="0"/>
+              </a:rPr>
+              <a:t> is a discontinuous, </a:t>
+            </a:r>
+            <a:r>
+              <a:rPr lang="en-US" b="0" i="0" u="none" strike="noStrike" dirty="0">
+                <a:solidFill>
+                  <a:srgbClr val="0645AD"/>
+                </a:solidFill>
+                <a:effectLst/>
+                <a:latin typeface="Arial" panose="020B0604020202020204" pitchFamily="34" charset="0"/>
+                <a:hlinkClick r:id="rId3" tooltip="Earthquake"/>
+              </a:rPr>
+              <a:t>earthquake</a:t>
+            </a:r>
+            <a:r>
+              <a:rPr lang="en-US" b="0" i="0" dirty="0">
+                <a:solidFill>
+                  <a:srgbClr val="202122"/>
+                </a:solidFill>
+                <a:effectLst/>
+                <a:latin typeface="Arial" panose="020B0604020202020204" pitchFamily="34" charset="0"/>
+              </a:rPr>
+              <a:t>-like event that releases energy over a period of hours to months, rather than the seconds to minutes characteristic of a typical earthquake.</a:t>
             </a:r>
             <a:endParaRPr lang="en-US" dirty="0"/>
+          </a:p>
+          <a:p>
+            <a:r>
+              <a:rPr lang="en-US" b="0" i="0" dirty="0">
+                <a:solidFill>
+                  <a:srgbClr val="262626"/>
+                </a:solidFill>
+                <a:effectLst/>
+                <a:latin typeface="PT Serif" panose="020B0604020202020204" pitchFamily="18" charset="0"/>
+              </a:rPr>
+              <a:t>Slow earthquakes are characterized by a wide spectrum of fault slip behaviors and seismic radiation patterns that differ from those of traditional earthquakes. </a:t>
+            </a:r>
+            <a:r>
+              <a:rPr lang="en-US" b="0" i="0" dirty="0">
+                <a:solidFill>
+                  <a:srgbClr val="262626"/>
+                </a:solidFill>
+                <a:effectLst/>
+                <a:latin typeface="PT Serif" panose="020A0603040505020204" pitchFamily="18" charset="0"/>
+              </a:rPr>
+              <a:t>However, slow earthquakes and huge megathrust earthquakes can have common slip mechanisms and are located in neighboring regions of the </a:t>
+            </a:r>
+            <a:r>
+              <a:rPr lang="en-US" b="0" i="0" dirty="0" err="1">
+                <a:solidFill>
+                  <a:srgbClr val="262626"/>
+                </a:solidFill>
+                <a:effectLst/>
+                <a:latin typeface="PT Serif" panose="020A0603040505020204" pitchFamily="18" charset="0"/>
+              </a:rPr>
+              <a:t>seismogenic</a:t>
+            </a:r>
+            <a:r>
+              <a:rPr lang="en-US" b="0" i="0" dirty="0">
+                <a:solidFill>
+                  <a:srgbClr val="262626"/>
+                </a:solidFill>
+                <a:effectLst/>
+                <a:latin typeface="PT Serif" panose="020A0603040505020204" pitchFamily="18" charset="0"/>
+              </a:rPr>
+              <a:t> zone. The frequent occurrence of slow earthquakes may help to reveal the physics underlying megathrust events as useful analogs. Understanding the slow earthquakes helps to better predict the other earthquakes.</a:t>
+            </a:r>
           </a:p>
         </p:txBody>
       </p:sp>
@@ -1440,7 +1526,7 @@
           <a:p>
             <a:fld id="{D09B9B78-9CB7-4BB8-B8EA-7B060E3CCB98}" type="slidenum">
               <a:rPr lang="en-US" smtClean="0"/>
-              <a:t>3</a:t>
+              <a:t>2</a:t>
             </a:fld>
             <a:endParaRPr lang="en-US"/>
           </a:p>
@@ -1449,7 +1535,7 @@
     </p:spTree>
     <p:extLst>
       <p:ext uri="{BB962C8B-B14F-4D97-AF65-F5344CB8AC3E}">
-        <p14:creationId xmlns:p14="http://schemas.microsoft.com/office/powerpoint/2010/main" val="2495129362"/>
+        <p14:creationId xmlns:p14="http://schemas.microsoft.com/office/powerpoint/2010/main" val="1568661478"/>
       </p:ext>
     </p:extLst>
   </p:cSld>
@@ -1504,31 +1590,27 @@
           <a:lstStyle/>
           <a:p>
             <a:r>
-              <a:rPr lang="en-US" dirty="0"/>
-              <a:t>The map shows the global Earthquake belt, such as the pacific rim. There exist large amounts of population and heavy economic activity, such as California, Japan, and Indonesia.</a:t>
-            </a:r>
-          </a:p>
-          <a:p>
-            <a:r>
-              <a:rPr lang="en-US" dirty="0"/>
-              <a:t>an earthquake costs huge damage in people’s property, health and lives.. Due to the long-period earth’s activity and complex geomaterials’ properties.</a:t>
-            </a:r>
-          </a:p>
-          <a:p>
-            <a:r>
-              <a:rPr lang="en-US" dirty="0"/>
-              <a:t>With the rapid development in </a:t>
-            </a:r>
-            <a:r>
-              <a:rPr lang="en-US" dirty="0" err="1"/>
-              <a:t>machin</a:t>
-            </a:r>
-            <a:r>
-              <a:rPr lang="en-US" dirty="0"/>
-              <a:t> learning and data science, forecasting a specific mechanism-related earthquake, becomes possible. </a:t>
-            </a:r>
-          </a:p>
-          <a:p>
+              <a:rPr lang="en-US" b="0" i="0" dirty="0">
+                <a:solidFill>
+                  <a:srgbClr val="000000"/>
+                </a:solidFill>
+                <a:effectLst/>
+                <a:latin typeface="open sans" panose="020B0606030504020204" pitchFamily="34" charset="0"/>
+              </a:rPr>
+              <a:t>two quieter earthquakes began slowly creeping along the Japan Trench toward the point where the massive, megathrust quake would erupt a month later.</a:t>
+            </a:r>
+          </a:p>
+          <a:p>
+            <a:r>
+              <a:rPr lang="en-US" b="0" i="0" dirty="0">
+                <a:solidFill>
+                  <a:srgbClr val="000000"/>
+                </a:solidFill>
+                <a:effectLst/>
+                <a:latin typeface="open sans" panose="020B0606030504020204" pitchFamily="34" charset="0"/>
+              </a:rPr>
+              <a:t>Image how many people’s lives and economic lost can be saved?</a:t>
+            </a:r>
             <a:endParaRPr lang="en-US" dirty="0"/>
           </a:p>
         </p:txBody>
@@ -1550,7 +1632,7 @@
           <a:p>
             <a:fld id="{D09B9B78-9CB7-4BB8-B8EA-7B060E3CCB98}" type="slidenum">
               <a:rPr lang="en-US" smtClean="0"/>
-              <a:t>4</a:t>
+              <a:t>3</a:t>
             </a:fld>
             <a:endParaRPr lang="en-US"/>
           </a:p>
@@ -1559,7 +1641,7 @@
     </p:spTree>
     <p:extLst>
       <p:ext uri="{BB962C8B-B14F-4D97-AF65-F5344CB8AC3E}">
-        <p14:creationId xmlns:p14="http://schemas.microsoft.com/office/powerpoint/2010/main" val="2119860865"/>
+        <p14:creationId xmlns:p14="http://schemas.microsoft.com/office/powerpoint/2010/main" val="2495129362"/>
       </p:ext>
     </p:extLst>
   </p:cSld>
@@ -1614,15 +1696,31 @@
           <a:lstStyle/>
           <a:p>
             <a:r>
-              <a:rPr lang="en-US" b="0" i="0" dirty="0">
-                <a:solidFill>
-                  <a:srgbClr val="202122"/>
-                </a:solidFill>
-                <a:effectLst/>
-                <a:latin typeface="Arial" panose="020B0604020202020204" pitchFamily="34" charset="0"/>
-              </a:rPr>
-              <a:t>previously assumed to be statistical noise, reflects the increasing emission of energy before its sudden release during a slip event. </a:t>
-            </a:r>
+              <a:rPr lang="en-US" dirty="0"/>
+              <a:t>The map shows the global Earthquake belt, such as the pacific rim. There exist large amounts of population and heavy economic activity, such as California, Japan, and Indonesia.</a:t>
+            </a:r>
+          </a:p>
+          <a:p>
+            <a:r>
+              <a:rPr lang="en-US" dirty="0"/>
+              <a:t>an earthquake costs huge damage in people’s property, health and lives.. Due to the long-period earth’s activity and complex geomaterials’ properties.</a:t>
+            </a:r>
+          </a:p>
+          <a:p>
+            <a:r>
+              <a:rPr lang="en-US" dirty="0"/>
+              <a:t>With the rapid development in </a:t>
+            </a:r>
+            <a:r>
+              <a:rPr lang="en-US" dirty="0" err="1"/>
+              <a:t>machin</a:t>
+            </a:r>
+            <a:r>
+              <a:rPr lang="en-US" dirty="0"/>
+              <a:t> learning and data science, forecasting a specific mechanism-related earthquake, becomes possible. </a:t>
+            </a:r>
+          </a:p>
+          <a:p>
             <a:endParaRPr lang="en-US" dirty="0"/>
           </a:p>
         </p:txBody>
@@ -1644,7 +1742,7 @@
           <a:p>
             <a:fld id="{D09B9B78-9CB7-4BB8-B8EA-7B060E3CCB98}" type="slidenum">
               <a:rPr lang="en-US" smtClean="0"/>
-              <a:t>5</a:t>
+              <a:t>4</a:t>
             </a:fld>
             <a:endParaRPr lang="en-US"/>
           </a:p>
@@ -1653,7 +1751,7 @@
     </p:spTree>
     <p:extLst>
       <p:ext uri="{BB962C8B-B14F-4D97-AF65-F5344CB8AC3E}">
-        <p14:creationId xmlns:p14="http://schemas.microsoft.com/office/powerpoint/2010/main" val="3271061074"/>
+        <p14:creationId xmlns:p14="http://schemas.microsoft.com/office/powerpoint/2010/main" val="2119860865"/>
       </p:ext>
     </p:extLst>
   </p:cSld>
@@ -1715,156 +1813,8 @@
                 <a:effectLst/>
                 <a:latin typeface="Arial" panose="020B0604020202020204" pitchFamily="34" charset="0"/>
               </a:rPr>
-              <a:t>slow earthquakes are caused by a variety of </a:t>
-            </a:r>
-            <a:r>
-              <a:rPr lang="en-US" b="0" i="0" u="none" strike="noStrike" dirty="0">
-                <a:solidFill>
-                  <a:srgbClr val="0645AD"/>
-                </a:solidFill>
-                <a:effectLst/>
-                <a:latin typeface="Arial" panose="020B0604020202020204" pitchFamily="34" charset="0"/>
-                <a:hlinkClick r:id="rId3" tooltip="Stick-slip phenomenon"/>
-              </a:rPr>
-              <a:t>stick-slip</a:t>
-            </a:r>
-            <a:r>
-              <a:rPr lang="en-US" b="0" i="0" dirty="0">
-                <a:solidFill>
-                  <a:srgbClr val="202122"/>
-                </a:solidFill>
-                <a:effectLst/>
-                <a:latin typeface="Arial" panose="020B0604020202020204" pitchFamily="34" charset="0"/>
-              </a:rPr>
-              <a:t> and creep processes intermediated between asperity-controlled </a:t>
-            </a:r>
-            <a:r>
-              <a:rPr lang="en-US" b="0" i="0" u="none" strike="noStrike" dirty="0">
-                <a:solidFill>
-                  <a:srgbClr val="0645AD"/>
-                </a:solidFill>
-                <a:effectLst/>
-                <a:latin typeface="Arial" panose="020B0604020202020204" pitchFamily="34" charset="0"/>
-                <a:hlinkClick r:id="rId4" tooltip="Fracture (geology)"/>
-              </a:rPr>
-              <a:t>brittle and ductile fracture</a:t>
-            </a:r>
-            <a:r>
-              <a:rPr lang="en-US" b="0" i="0" dirty="0">
-                <a:solidFill>
-                  <a:srgbClr val="202122"/>
-                </a:solidFill>
-                <a:effectLst/>
-                <a:latin typeface="Arial" panose="020B0604020202020204" pitchFamily="34" charset="0"/>
-              </a:rPr>
-              <a:t>.</a:t>
-            </a:r>
-            <a:r>
-              <a:rPr lang="en-US" b="0" i="0" baseline="30000" dirty="0">
-                <a:solidFill>
-                  <a:srgbClr val="202122"/>
-                </a:solidFill>
-                <a:effectLst/>
-                <a:latin typeface="Arial" panose="020B0604020202020204" pitchFamily="34" charset="0"/>
-              </a:rPr>
-              <a:t>[</a:t>
-            </a:r>
-            <a:r>
-              <a:rPr lang="en-US" b="0" i="0" u="none" strike="noStrike" dirty="0">
-                <a:solidFill>
-                  <a:srgbClr val="0645AD"/>
-                </a:solidFill>
-                <a:effectLst/>
-                <a:latin typeface="Arial" panose="020B0604020202020204" pitchFamily="34" charset="0"/>
-                <a:hlinkClick r:id="rId5" tooltip="Asperity (materials science)"/>
-              </a:rPr>
-              <a:t>Asperities</a:t>
-            </a:r>
-            <a:r>
-              <a:rPr lang="en-US" b="0" i="0" dirty="0">
-                <a:solidFill>
-                  <a:srgbClr val="202122"/>
-                </a:solidFill>
-                <a:effectLst/>
-                <a:latin typeface="Arial" panose="020B0604020202020204" pitchFamily="34" charset="0"/>
-              </a:rPr>
-              <a:t> are tiny bumps and protrusions along the faces of fractures. They are best documented from intermediate crustal levels of certain </a:t>
-            </a:r>
-            <a:r>
-              <a:rPr lang="en-US" b="0" i="0" u="none" strike="noStrike" dirty="0">
-                <a:solidFill>
-                  <a:srgbClr val="0645AD"/>
-                </a:solidFill>
-                <a:effectLst/>
-                <a:latin typeface="Arial" panose="020B0604020202020204" pitchFamily="34" charset="0"/>
-                <a:hlinkClick r:id="rId6" tooltip="Subduction zones"/>
-              </a:rPr>
-              <a:t>subduction zones</a:t>
-            </a:r>
-            <a:r>
-              <a:rPr lang="en-US" b="0" i="0" dirty="0">
-                <a:solidFill>
-                  <a:srgbClr val="202122"/>
-                </a:solidFill>
-                <a:effectLst/>
-                <a:latin typeface="Arial" panose="020B0604020202020204" pitchFamily="34" charset="0"/>
-              </a:rPr>
-              <a:t> (especially those that dip shallowly — SW Japan, Cascadia,</a:t>
-            </a:r>
-            <a:r>
-              <a:rPr lang="en-US" b="0" i="0" u="none" strike="noStrike" baseline="30000" dirty="0">
-                <a:solidFill>
-                  <a:srgbClr val="0645AD"/>
-                </a:solidFill>
-                <a:effectLst/>
-                <a:latin typeface="Arial" panose="020B0604020202020204" pitchFamily="34" charset="0"/>
-                <a:hlinkClick r:id="rId7"/>
-              </a:rPr>
-              <a:t>[6]</a:t>
-            </a:r>
-            <a:r>
-              <a:rPr lang="en-US" b="0" i="0" dirty="0">
-                <a:solidFill>
-                  <a:srgbClr val="202122"/>
-                </a:solidFill>
-                <a:effectLst/>
-                <a:latin typeface="Arial" panose="020B0604020202020204" pitchFamily="34" charset="0"/>
-              </a:rPr>
-              <a:t> Chile)</a:t>
-            </a:r>
-          </a:p>
-          <a:p>
-            <a:pPr marL="0" marR="0" lvl="0" indent="0" algn="l" defTabSz="914400" rtl="0" eaLnBrk="1" fontAlgn="auto" latinLnBrk="0" hangingPunct="1">
-              <a:lnSpc>
-                <a:spcPct val="100000"/>
-              </a:lnSpc>
-              <a:spcBef>
-                <a:spcPts val="0"/>
-              </a:spcBef>
-              <a:spcAft>
-                <a:spcPts val="0"/>
-              </a:spcAft>
-              <a:buClrTx/>
-              <a:buSzTx/>
-              <a:buFontTx/>
-              <a:buNone/>
-              <a:tabLst/>
-              <a:defRPr/>
-            </a:pPr>
-            <a:r>
-              <a:rPr lang="en-US" b="0" i="0" dirty="0">
-                <a:effectLst/>
-                <a:latin typeface="Arial" panose="020B0604020202020204" pitchFamily="34" charset="0"/>
-                <a:cs typeface="Arial" panose="020B0604020202020204" pitchFamily="34" charset="0"/>
-              </a:rPr>
-              <a:t>Two fault gouge layers are sheared simultaneously while subjected to a constant normal load and a prescribed shear velocity. The laboratory faults fail in repetitive cycles of stick and slip that is meant to mimic the cycle of loading and failure on tectonic faults.</a:t>
-            </a:r>
-            <a:endParaRPr lang="en-US" dirty="0">
-              <a:latin typeface="Arial" panose="020B0604020202020204" pitchFamily="34" charset="0"/>
-              <a:cs typeface="Arial" panose="020B0604020202020204" pitchFamily="34" charset="0"/>
-            </a:endParaRPr>
-          </a:p>
-          <a:p>
+              <a:t>previously assumed to be statistical noise, reflects the increasing emission of energy before its sudden release during a slip event. </a:t>
+            </a:r>
             <a:endParaRPr lang="en-US" dirty="0"/>
           </a:p>
         </p:txBody>
@@ -1886,7 +1836,7 @@
           <a:p>
             <a:fld id="{D09B9B78-9CB7-4BB8-B8EA-7B060E3CCB98}" type="slidenum">
               <a:rPr lang="en-US" smtClean="0"/>
-              <a:t>6</a:t>
+              <a:t>5</a:t>
             </a:fld>
             <a:endParaRPr lang="en-US"/>
           </a:p>
@@ -1895,7 +1845,7 @@
     </p:spTree>
     <p:extLst>
       <p:ext uri="{BB962C8B-B14F-4D97-AF65-F5344CB8AC3E}">
-        <p14:creationId xmlns:p14="http://schemas.microsoft.com/office/powerpoint/2010/main" val="1324703995"/>
+        <p14:creationId xmlns:p14="http://schemas.microsoft.com/office/powerpoint/2010/main" val="3271061074"/>
       </p:ext>
     </p:extLst>
   </p:cSld>
@@ -1950,21 +1900,164 @@
           <a:lstStyle/>
           <a:p>
             <a:r>
-              <a:rPr lang="en-US" dirty="0"/>
-              <a:t>We need to split the single file into </a:t>
-            </a:r>
-          </a:p>
-          <a:p>
-            <a:r>
-              <a:rPr lang="en-US" dirty="0"/>
-              <a:t>After split the dataset, we create about 8400 labels, </a:t>
-            </a:r>
-          </a:p>
-          <a:p>
-            <a:r>
-              <a:rPr lang="en-US" dirty="0"/>
-              <a:t>Assume each label is irrelevant, shuffle.</a:t>
-            </a:r>
+              <a:rPr lang="en-US" b="0" i="0" dirty="0">
+                <a:solidFill>
+                  <a:srgbClr val="202122"/>
+                </a:solidFill>
+                <a:effectLst/>
+                <a:latin typeface="Arial" panose="020B0604020202020204" pitchFamily="34" charset="0"/>
+              </a:rPr>
+              <a:t>slow earthquakes are caused by a variety of </a:t>
+            </a:r>
+            <a:r>
+              <a:rPr lang="en-US" b="0" i="0" u="none" strike="noStrike" dirty="0">
+                <a:solidFill>
+                  <a:srgbClr val="0645AD"/>
+                </a:solidFill>
+                <a:effectLst/>
+                <a:latin typeface="Arial" panose="020B0604020202020204" pitchFamily="34" charset="0"/>
+                <a:hlinkClick r:id="rId3" tooltip="Stick-slip phenomenon"/>
+              </a:rPr>
+              <a:t>stick-slip</a:t>
+            </a:r>
+            <a:r>
+              <a:rPr lang="en-US" b="0" i="0" dirty="0">
+                <a:solidFill>
+                  <a:srgbClr val="202122"/>
+                </a:solidFill>
+                <a:effectLst/>
+                <a:latin typeface="Arial" panose="020B0604020202020204" pitchFamily="34" charset="0"/>
+              </a:rPr>
+              <a:t> and creep processes intermediated between asperity-controlled </a:t>
+            </a:r>
+            <a:r>
+              <a:rPr lang="en-US" b="0" i="0" u="none" strike="noStrike" dirty="0">
+                <a:solidFill>
+                  <a:srgbClr val="0645AD"/>
+                </a:solidFill>
+                <a:effectLst/>
+                <a:latin typeface="Arial" panose="020B0604020202020204" pitchFamily="34" charset="0"/>
+                <a:hlinkClick r:id="rId4" tooltip="Fracture (geology)"/>
+              </a:rPr>
+              <a:t>brittle and ductile fracture</a:t>
+            </a:r>
+            <a:r>
+              <a:rPr lang="en-US" b="0" i="0" dirty="0">
+                <a:solidFill>
+                  <a:srgbClr val="202122"/>
+                </a:solidFill>
+                <a:effectLst/>
+                <a:latin typeface="Arial" panose="020B0604020202020204" pitchFamily="34" charset="0"/>
+              </a:rPr>
+              <a:t>.</a:t>
+            </a:r>
+            <a:r>
+              <a:rPr lang="en-US" b="0" i="0" baseline="30000" dirty="0">
+                <a:solidFill>
+                  <a:srgbClr val="202122"/>
+                </a:solidFill>
+                <a:effectLst/>
+                <a:latin typeface="Arial" panose="020B0604020202020204" pitchFamily="34" charset="0"/>
+              </a:rPr>
+              <a:t>[</a:t>
+            </a:r>
+            <a:r>
+              <a:rPr lang="en-US" b="0" i="0" u="none" strike="noStrike" dirty="0">
+                <a:solidFill>
+                  <a:srgbClr val="0645AD"/>
+                </a:solidFill>
+                <a:effectLst/>
+                <a:latin typeface="Arial" panose="020B0604020202020204" pitchFamily="34" charset="0"/>
+                <a:hlinkClick r:id="rId5" tooltip="Asperity (materials science)"/>
+              </a:rPr>
+              <a:t>Asperities</a:t>
+            </a:r>
+            <a:r>
+              <a:rPr lang="en-US" b="0" i="0" dirty="0">
+                <a:solidFill>
+                  <a:srgbClr val="202122"/>
+                </a:solidFill>
+                <a:effectLst/>
+                <a:latin typeface="Arial" panose="020B0604020202020204" pitchFamily="34" charset="0"/>
+              </a:rPr>
+              <a:t> are tiny bumps and protrusions along the faces of fractures. They are best documented from intermediate crustal levels of certain </a:t>
+            </a:r>
+            <a:r>
+              <a:rPr lang="en-US" b="0" i="0" u="none" strike="noStrike" dirty="0">
+                <a:solidFill>
+                  <a:srgbClr val="0645AD"/>
+                </a:solidFill>
+                <a:effectLst/>
+                <a:latin typeface="Arial" panose="020B0604020202020204" pitchFamily="34" charset="0"/>
+                <a:hlinkClick r:id="rId6" tooltip="Subduction zones"/>
+              </a:rPr>
+              <a:t>subduction zones</a:t>
+            </a:r>
+            <a:r>
+              <a:rPr lang="en-US" b="0" i="0" dirty="0">
+                <a:solidFill>
+                  <a:srgbClr val="202122"/>
+                </a:solidFill>
+                <a:effectLst/>
+                <a:latin typeface="Arial" panose="020B0604020202020204" pitchFamily="34" charset="0"/>
+              </a:rPr>
+              <a:t> (especially those that dip shallowly — SW Japan, Cascadia,</a:t>
+            </a:r>
+            <a:r>
+              <a:rPr lang="en-US" b="0" i="0" u="none" strike="noStrike" baseline="30000" dirty="0">
+                <a:solidFill>
+                  <a:srgbClr val="0645AD"/>
+                </a:solidFill>
+                <a:effectLst/>
+                <a:latin typeface="Arial" panose="020B0604020202020204" pitchFamily="34" charset="0"/>
+                <a:hlinkClick r:id="rId7"/>
+              </a:rPr>
+              <a:t>[6]</a:t>
+            </a:r>
+            <a:r>
+              <a:rPr lang="en-US" b="0" i="0" dirty="0">
+                <a:solidFill>
+                  <a:srgbClr val="202122"/>
+                </a:solidFill>
+                <a:effectLst/>
+                <a:latin typeface="Arial" panose="020B0604020202020204" pitchFamily="34" charset="0"/>
+              </a:rPr>
+              <a:t> Chile)</a:t>
+            </a:r>
+          </a:p>
+          <a:p>
+            <a:pPr marL="0" marR="0" lvl="0" indent="0" algn="l" defTabSz="914400" rtl="0" eaLnBrk="1" fontAlgn="auto" latinLnBrk="0" hangingPunct="1">
+              <a:lnSpc>
+                <a:spcPct val="100000"/>
+              </a:lnSpc>
+              <a:spcBef>
+                <a:spcPts val="0"/>
+              </a:spcBef>
+              <a:spcAft>
+                <a:spcPts val="0"/>
+              </a:spcAft>
+              <a:buClrTx/>
+              <a:buSzTx/>
+              <a:buFontTx/>
+              <a:buNone/>
+              <a:tabLst/>
+              <a:defRPr/>
+            </a:pPr>
+            <a:r>
+              <a:rPr lang="en-US" b="0" i="0" dirty="0">
+                <a:effectLst/>
+                <a:latin typeface="Arial" panose="020B0604020202020204" pitchFamily="34" charset="0"/>
+                <a:cs typeface="Arial" panose="020B0604020202020204" pitchFamily="34" charset="0"/>
+              </a:rPr>
+              <a:t>Two fault gouge layers are sheared simultaneously while subjected to a constant normal load and a prescribed shear velocity. The laboratory faults fail in repetitive cycles of stick and slip that is meant to mimic the cycle of loading and failure on tectonic faults.</a:t>
+            </a:r>
+            <a:endParaRPr lang="en-US" dirty="0">
+              <a:latin typeface="Arial" panose="020B0604020202020204" pitchFamily="34" charset="0"/>
+              <a:cs typeface="Arial" panose="020B0604020202020204" pitchFamily="34" charset="0"/>
+            </a:endParaRPr>
+          </a:p>
+          <a:p>
+            <a:endParaRPr lang="en-US" dirty="0"/>
           </a:p>
         </p:txBody>
       </p:sp>
@@ -1985,7 +2078,7 @@
           <a:p>
             <a:fld id="{D09B9B78-9CB7-4BB8-B8EA-7B060E3CCB98}" type="slidenum">
               <a:rPr lang="en-US" smtClean="0"/>
-              <a:t>7</a:t>
+              <a:t>6</a:t>
             </a:fld>
             <a:endParaRPr lang="en-US"/>
           </a:p>
@@ -1994,7 +2087,7 @@
     </p:spTree>
     <p:extLst>
       <p:ext uri="{BB962C8B-B14F-4D97-AF65-F5344CB8AC3E}">
-        <p14:creationId xmlns:p14="http://schemas.microsoft.com/office/powerpoint/2010/main" val="3940045733"/>
+        <p14:creationId xmlns:p14="http://schemas.microsoft.com/office/powerpoint/2010/main" val="1324703995"/>
       </p:ext>
     </p:extLst>
   </p:cSld>
@@ -2050,24 +2143,20 @@
           <a:p>
             <a:r>
               <a:rPr lang="en-US" dirty="0"/>
-              <a:t>Using a series features to represent 150 k points of signal in time-domain.</a:t>
-            </a:r>
-          </a:p>
-          <a:p>
-            <a:endParaRPr lang="en-US" dirty="0"/>
-          </a:p>
-          <a:p>
-            <a:r>
-              <a:rPr lang="en-US" b="0" i="0" dirty="0">
-                <a:solidFill>
-                  <a:srgbClr val="202124"/>
-                </a:solidFill>
-                <a:effectLst/>
-                <a:latin typeface="Roboto" panose="02000000000000000000" pitchFamily="2" charset="0"/>
-              </a:rPr>
-              <a:t>refers to the degree of correlation of the same variables between two successive time intervals.</a:t>
-            </a:r>
-            <a:endParaRPr lang="en-US" dirty="0"/>
+              <a:t>We need to split the single file into </a:t>
+            </a:r>
+          </a:p>
+          <a:p>
+            <a:r>
+              <a:rPr lang="en-US" dirty="0"/>
+              <a:t>After split the dataset, we create about 8400 labels, </a:t>
+            </a:r>
+          </a:p>
+          <a:p>
+            <a:r>
+              <a:rPr lang="en-US" dirty="0"/>
+              <a:t>Assume each label is irrelevant, shuffle.</a:t>
+            </a:r>
           </a:p>
         </p:txBody>
       </p:sp>
@@ -2088,7 +2177,7 @@
           <a:p>
             <a:fld id="{D09B9B78-9CB7-4BB8-B8EA-7B060E3CCB98}" type="slidenum">
               <a:rPr lang="en-US" smtClean="0"/>
-              <a:t>8</a:t>
+              <a:t>7</a:t>
             </a:fld>
             <a:endParaRPr lang="en-US"/>
           </a:p>
@@ -2097,7 +2186,7 @@
     </p:spTree>
     <p:extLst>
       <p:ext uri="{BB962C8B-B14F-4D97-AF65-F5344CB8AC3E}">
-        <p14:creationId xmlns:p14="http://schemas.microsoft.com/office/powerpoint/2010/main" val="3698136240"/>
+        <p14:creationId xmlns:p14="http://schemas.microsoft.com/office/powerpoint/2010/main" val="3940045733"/>
       </p:ext>
     </p:extLst>
   </p:cSld>
@@ -2153,8 +2242,24 @@
           <a:p>
             <a:r>
               <a:rPr lang="en-US" dirty="0"/>
-              <a:t>blender</a:t>
-            </a:r>
+              <a:t>Using a series features to represent 150 k points of signal in time-domain.</a:t>
+            </a:r>
+          </a:p>
+          <a:p>
+            <a:endParaRPr lang="en-US" dirty="0"/>
+          </a:p>
+          <a:p>
+            <a:r>
+              <a:rPr lang="en-US" b="0" i="0" dirty="0">
+                <a:solidFill>
+                  <a:srgbClr val="202124"/>
+                </a:solidFill>
+                <a:effectLst/>
+                <a:latin typeface="Roboto" panose="02000000000000000000" pitchFamily="2" charset="0"/>
+              </a:rPr>
+              <a:t>refers to the degree of correlation of the same variables between two successive time intervals.</a:t>
+            </a:r>
+            <a:endParaRPr lang="en-US" dirty="0"/>
           </a:p>
         </p:txBody>
       </p:sp>
@@ -2175,7 +2280,7 @@
           <a:p>
             <a:fld id="{D09B9B78-9CB7-4BB8-B8EA-7B060E3CCB98}" type="slidenum">
               <a:rPr lang="en-US" smtClean="0"/>
-              <a:t>9</a:t>
+              <a:t>8</a:t>
             </a:fld>
             <a:endParaRPr lang="en-US"/>
           </a:p>
@@ -2184,7 +2289,7 @@
     </p:spTree>
     <p:extLst>
       <p:ext uri="{BB962C8B-B14F-4D97-AF65-F5344CB8AC3E}">
-        <p14:creationId xmlns:p14="http://schemas.microsoft.com/office/powerpoint/2010/main" val="3615708672"/>
+        <p14:creationId xmlns:p14="http://schemas.microsoft.com/office/powerpoint/2010/main" val="3698136240"/>
       </p:ext>
     </p:extLst>
   </p:cSld>
@@ -2238,6 +2343,12 @@
           <a:bodyPr/>
           <a:lstStyle/>
           <a:p>
+            <a:r>
+              <a:rPr lang="en-US" dirty="0"/>
+              <a:t>Blender</a:t>
+            </a:r>
+          </a:p>
+          <a:p>
             <a:pPr marL="0" marR="0" lvl="0" indent="0" algn="l" defTabSz="914400" rtl="0" eaLnBrk="1" fontAlgn="auto" latinLnBrk="0" hangingPunct="1">
               <a:lnSpc>
                 <a:spcPct val="100000"/>
@@ -2256,8 +2367,15 @@
               <a:defRPr/>
             </a:pPr>
             <a:r>
-              <a:rPr lang="en-US" dirty="0"/>
-              <a:t>Correlation between a single feature and the label ranges from –0.6 to 0.6</a:t>
+              <a:rPr lang="en-US" b="0" i="0" u="none" strike="noStrike" dirty="0">
+                <a:solidFill>
+                  <a:srgbClr val="1A0DAB"/>
+                </a:solidFill>
+                <a:effectLst/>
+                <a:latin typeface="Roboto" panose="02000000000000000000" pitchFamily="2" charset="0"/>
+                <a:hlinkClick r:id="rId3"/>
+              </a:rPr>
+              <a:t>t-distributed stochastic neighbor embedding</a:t>
             </a:r>
           </a:p>
           <a:p>
@@ -2282,7 +2400,7 @@
           <a:p>
             <a:fld id="{D09B9B78-9CB7-4BB8-B8EA-7B060E3CCB98}" type="slidenum">
               <a:rPr lang="en-US" smtClean="0"/>
-              <a:t>10</a:t>
+              <a:t>9</a:t>
             </a:fld>
             <a:endParaRPr lang="en-US"/>
           </a:p>
@@ -2291,7 +2409,7 @@
     </p:spTree>
     <p:extLst>
       <p:ext uri="{BB962C8B-B14F-4D97-AF65-F5344CB8AC3E}">
-        <p14:creationId xmlns:p14="http://schemas.microsoft.com/office/powerpoint/2010/main" val="1546233132"/>
+        <p14:creationId xmlns:p14="http://schemas.microsoft.com/office/powerpoint/2010/main" val="3615708672"/>
       </p:ext>
     </p:extLst>
   </p:cSld>
@@ -2448,7 +2566,7 @@
           <a:p>
             <a:fld id="{BF8A6F9E-1D50-4216-BCC6-681CDBB3D516}" type="datetime1">
               <a:rPr lang="en-US" smtClean="0"/>
-              <a:t>10/4/2022</a:t>
+              <a:t>3/6/2023</a:t>
             </a:fld>
             <a:endParaRPr lang="en-US"/>
           </a:p>
@@ -2646,7 +2764,7 @@
           <a:p>
             <a:fld id="{6CBFA9DE-870D-41F3-94F4-323830A26413}" type="datetime1">
               <a:rPr lang="en-US" smtClean="0"/>
-              <a:t>10/4/2022</a:t>
+              <a:t>3/6/2023</a:t>
             </a:fld>
             <a:endParaRPr lang="en-US"/>
           </a:p>
@@ -2854,7 +2972,7 @@
           <a:p>
             <a:fld id="{53538E60-54A6-4A23-84A6-612AE560DAF1}" type="datetime1">
               <a:rPr lang="en-US" smtClean="0"/>
-              <a:t>10/4/2022</a:t>
+              <a:t>3/6/2023</a:t>
             </a:fld>
             <a:endParaRPr lang="en-US"/>
           </a:p>
@@ -3097,7 +3215,7 @@
           <a:p>
             <a:fld id="{A626FA12-7B62-44C2-AD05-C1EBBCF7C357}" type="datetime1">
               <a:rPr lang="en-US" smtClean="0"/>
-              <a:t>10/4/2022</a:t>
+              <a:t>3/6/2023</a:t>
             </a:fld>
             <a:endParaRPr lang="en-US"/>
           </a:p>
@@ -3387,7 +3505,7 @@
           <a:p>
             <a:fld id="{9B93A993-C215-41E9-8C4F-02E398E181A0}" type="datetime1">
               <a:rPr lang="en-US" smtClean="0"/>
-              <a:t>10/4/2022</a:t>
+              <a:t>3/6/2023</a:t>
             </a:fld>
             <a:endParaRPr lang="en-US"/>
           </a:p>
@@ -3652,7 +3770,7 @@
           <a:p>
             <a:fld id="{5093AF4E-D3A1-46A3-BEA3-760A8E479379}" type="datetime1">
               <a:rPr lang="en-US" smtClean="0"/>
-              <a:t>10/4/2022</a:t>
+              <a:t>3/6/2023</a:t>
             </a:fld>
             <a:endParaRPr lang="en-US"/>
           </a:p>
@@ -4064,7 +4182,7 @@
           <a:p>
             <a:fld id="{459D1ABA-3FFC-4D22-BDB3-72919F00C409}" type="datetime1">
               <a:rPr lang="en-US" smtClean="0"/>
-              <a:t>10/4/2022</a:t>
+              <a:t>3/6/2023</a:t>
             </a:fld>
             <a:endParaRPr lang="en-US"/>
           </a:p>
@@ -4205,7 +4323,7 @@
           <a:p>
             <a:fld id="{DB3B2D57-C699-4F04-B976-88AD9572EA47}" type="datetime1">
               <a:rPr lang="en-US" smtClean="0"/>
-              <a:t>10/4/2022</a:t>
+              <a:t>3/6/2023</a:t>
             </a:fld>
             <a:endParaRPr lang="en-US"/>
           </a:p>
@@ -4318,7 +4436,7 @@
           <a:p>
             <a:fld id="{B8126837-E981-4FEA-8F2F-C0E59F6F29CB}" type="datetime1">
               <a:rPr lang="en-US" smtClean="0"/>
-              <a:t>10/4/2022</a:t>
+              <a:t>3/6/2023</a:t>
             </a:fld>
             <a:endParaRPr lang="en-US"/>
           </a:p>
@@ -4629,7 +4747,7 @@
           <a:p>
             <a:fld id="{8B455284-9BE5-49DA-8FF2-EE450A1531B9}" type="datetime1">
               <a:rPr lang="en-US" smtClean="0"/>
-              <a:t>10/4/2022</a:t>
+              <a:t>3/6/2023</a:t>
             </a:fld>
             <a:endParaRPr lang="en-US"/>
           </a:p>
@@ -4917,7 +5035,7 @@
           <a:p>
             <a:fld id="{BBF9386C-6855-4E79-83CF-F8D5192A6690}" type="datetime1">
               <a:rPr lang="en-US" smtClean="0"/>
-              <a:t>10/4/2022</a:t>
+              <a:t>3/6/2023</a:t>
             </a:fld>
             <a:endParaRPr lang="en-US"/>
           </a:p>
@@ -5158,7 +5276,7 @@
           <a:p>
             <a:fld id="{E5505A47-A0AB-4343-9568-1058AF8E1321}" type="datetime1">
               <a:rPr lang="en-US" smtClean="0"/>
-              <a:t>10/4/2022</a:t>
+              <a:t>3/6/2023</a:t>
             </a:fld>
             <a:endParaRPr lang="en-US"/>
           </a:p>
@@ -7486,7 +7604,7 @@
           <a:p>
             <a:r>
               <a:rPr lang="en-US" dirty="0"/>
-              <a:t>Errors</a:t>
+              <a:t>Errors on testing set</a:t>
             </a:r>
           </a:p>
         </p:txBody>
@@ -7711,7 +7829,7 @@
           <p:cNvPr id="2" name="Title 1">
             <a:extLst>
               <a:ext uri="{FF2B5EF4-FFF2-40B4-BE49-F238E27FC236}">
-                <a16:creationId xmlns:a16="http://schemas.microsoft.com/office/drawing/2014/main" id="{FEECFF2B-5B29-48D9-B2ED-38C67F117607}"/>
+                <a16:creationId xmlns:a16="http://schemas.microsoft.com/office/drawing/2014/main" id="{16575E58-EC17-4BF6-B9DF-D5AD5F48A74E}"/>
               </a:ext>
             </a:extLst>
           </p:cNvPr>
@@ -7729,7 +7847,7 @@
           <a:p>
             <a:r>
               <a:rPr lang="en-US" dirty="0"/>
-              <a:t>Future work</a:t>
+              <a:t>Kaggle ranking</a:t>
             </a:r>
           </a:p>
         </p:txBody>
@@ -7739,7 +7857,7 @@
           <p:cNvPr id="3" name="Content Placeholder 2">
             <a:extLst>
               <a:ext uri="{FF2B5EF4-FFF2-40B4-BE49-F238E27FC236}">
-                <a16:creationId xmlns:a16="http://schemas.microsoft.com/office/drawing/2014/main" id="{895CFE86-4CE3-4459-B124-316B013C995C}"/>
+                <a16:creationId xmlns:a16="http://schemas.microsoft.com/office/drawing/2014/main" id="{D2F78418-EFAD-4341-9EF9-18D6E3EE91A3}"/>
               </a:ext>
             </a:extLst>
           </p:cNvPr>
@@ -7755,48 +7873,7 @@
           <a:bodyPr/>
           <a:lstStyle/>
           <a:p>
-            <a:r>
-              <a:rPr lang="en-US" dirty="0"/>
-              <a:t>Improve feature engineering</a:t>
-            </a:r>
-          </a:p>
-          <a:p>
-            <a:r>
-              <a:rPr lang="en-US" dirty="0"/>
-              <a:t>Deep/Recurrent neural network</a:t>
-            </a:r>
-          </a:p>
-          <a:p>
-            <a:r>
-              <a:rPr lang="en-US" dirty="0"/>
-              <a:t>Potential application</a:t>
-            </a:r>
-          </a:p>
-          <a:p>
-            <a:pPr lvl="1"/>
-            <a:r>
-              <a:rPr lang="en-US" dirty="0"/>
-              <a:t>Cell phone app for the science lovers</a:t>
-            </a:r>
-          </a:p>
-          <a:p>
-            <a:pPr lvl="1"/>
-            <a:r>
-              <a:rPr lang="en-US" dirty="0"/>
-              <a:t>Monitor storage site safety: nuclear waste, CO</a:t>
-            </a:r>
-            <a:r>
-              <a:rPr lang="en-US" baseline="-25000" dirty="0"/>
-              <a:t>2</a:t>
-            </a:r>
-            <a:r>
-              <a:rPr lang="en-US" dirty="0"/>
-              <a:t> reservoir</a:t>
-            </a:r>
-          </a:p>
-          <a:p>
-            <a:pPr lvl="1"/>
-            <a:endParaRPr lang="en-US" dirty="0"/>
+            <a:endParaRPr lang="en-US"/>
           </a:p>
         </p:txBody>
       </p:sp>
@@ -7805,7 +7882,7 @@
           <p:cNvPr id="4" name="Slide Number Placeholder 3">
             <a:extLst>
               <a:ext uri="{FF2B5EF4-FFF2-40B4-BE49-F238E27FC236}">
-                <a16:creationId xmlns:a16="http://schemas.microsoft.com/office/drawing/2014/main" id="{5440C170-1DE6-4C05-8881-B8C7D45DCF2C}"/>
+                <a16:creationId xmlns:a16="http://schemas.microsoft.com/office/drawing/2014/main" id="{5C28FD32-977D-44B5-B59B-41A6643E902F}"/>
               </a:ext>
             </a:extLst>
           </p:cNvPr>
@@ -7830,10 +7907,162 @@
           </a:p>
         </p:txBody>
       </p:sp>
+      <p:pic>
+        <p:nvPicPr>
+          <p:cNvPr id="6" name="Picture 5">
+            <a:extLst>
+              <a:ext uri="{FF2B5EF4-FFF2-40B4-BE49-F238E27FC236}">
+                <a16:creationId xmlns:a16="http://schemas.microsoft.com/office/drawing/2014/main" id="{8EE50620-F648-4B22-B7C2-55B403674C94}"/>
+              </a:ext>
+            </a:extLst>
+          </p:cNvPr>
+          <p:cNvPicPr>
+            <a:picLocks noChangeAspect="1"/>
+          </p:cNvPicPr>
+          <p:nvPr/>
+        </p:nvPicPr>
+        <p:blipFill>
+          <a:blip r:embed="rId2"/>
+          <a:stretch>
+            <a:fillRect/>
+          </a:stretch>
+        </p:blipFill>
+        <p:spPr>
+          <a:xfrm>
+            <a:off x="838200" y="1825625"/>
+            <a:ext cx="10506075" cy="1543050"/>
+          </a:xfrm>
+          <a:prstGeom prst="rect">
+            <a:avLst/>
+          </a:prstGeom>
+        </p:spPr>
+      </p:pic>
+      <p:pic>
+        <p:nvPicPr>
+          <p:cNvPr id="8" name="Picture 7">
+            <a:extLst>
+              <a:ext uri="{FF2B5EF4-FFF2-40B4-BE49-F238E27FC236}">
+                <a16:creationId xmlns:a16="http://schemas.microsoft.com/office/drawing/2014/main" id="{FB878F1A-E576-4718-AFD4-CB15911A14A4}"/>
+              </a:ext>
+            </a:extLst>
+          </p:cNvPr>
+          <p:cNvPicPr>
+            <a:picLocks noChangeAspect="1"/>
+          </p:cNvPicPr>
+          <p:nvPr/>
+        </p:nvPicPr>
+        <p:blipFill>
+          <a:blip r:embed="rId3"/>
+          <a:stretch>
+            <a:fillRect/>
+          </a:stretch>
+        </p:blipFill>
+        <p:spPr>
+          <a:xfrm>
+            <a:off x="838200" y="3886994"/>
+            <a:ext cx="10639425" cy="1771650"/>
+          </a:xfrm>
+          <a:prstGeom prst="rect">
+            <a:avLst/>
+          </a:prstGeom>
+        </p:spPr>
+      </p:pic>
+      <p:sp>
+        <p:nvSpPr>
+          <p:cNvPr id="9" name="TextBox 8">
+            <a:extLst>
+              <a:ext uri="{FF2B5EF4-FFF2-40B4-BE49-F238E27FC236}">
+                <a16:creationId xmlns:a16="http://schemas.microsoft.com/office/drawing/2014/main" id="{CDE7BB11-C53D-43B5-9F3C-34B15699DD6D}"/>
+              </a:ext>
+            </a:extLst>
+          </p:cNvPr>
+          <p:cNvSpPr txBox="1"/>
+          <p:nvPr/>
+        </p:nvSpPr>
+        <p:spPr>
+          <a:xfrm>
+            <a:off x="5434587" y="5759639"/>
+            <a:ext cx="5981125" cy="369332"/>
+          </a:xfrm>
+          <a:prstGeom prst="rect">
+            <a:avLst/>
+          </a:prstGeom>
+          <a:noFill/>
+        </p:spPr>
+        <p:txBody>
+          <a:bodyPr wrap="none" rtlCol="0">
+            <a:spAutoFit/>
+          </a:bodyPr>
+          <a:lstStyle/>
+          <a:p>
+            <a:r>
+              <a:rPr lang="en-US" dirty="0">
+                <a:latin typeface="Arial" panose="020B0604020202020204" pitchFamily="34" charset="0"/>
+                <a:cs typeface="Arial" panose="020B0604020202020204" pitchFamily="34" charset="0"/>
+              </a:rPr>
+              <a:t>(Better than 3% of private score Leaderboard on Kaggle)</a:t>
+            </a:r>
+          </a:p>
+        </p:txBody>
+      </p:sp>
+      <p:sp>
+        <p:nvSpPr>
+          <p:cNvPr id="10" name="Rectangle: Rounded Corners 9">
+            <a:extLst>
+              <a:ext uri="{FF2B5EF4-FFF2-40B4-BE49-F238E27FC236}">
+                <a16:creationId xmlns:a16="http://schemas.microsoft.com/office/drawing/2014/main" id="{ECAF77D3-0DD5-4C01-8417-AF656417EC37}"/>
+              </a:ext>
+            </a:extLst>
+          </p:cNvPr>
+          <p:cNvSpPr/>
+          <p:nvPr/>
+        </p:nvSpPr>
+        <p:spPr>
+          <a:xfrm>
+            <a:off x="2681654" y="3094892"/>
+            <a:ext cx="2206869" cy="273783"/>
+          </a:xfrm>
+          <a:prstGeom prst="roundRect">
+            <a:avLst/>
+          </a:prstGeom>
+          <a:solidFill>
+            <a:schemeClr val="bg1"/>
+          </a:solidFill>
+          <a:ln>
+            <a:solidFill>
+              <a:schemeClr val="bg1"/>
+            </a:solidFill>
+          </a:ln>
+        </p:spPr>
+        <p:style>
+          <a:lnRef idx="2">
+            <a:schemeClr val="accent1">
+              <a:shade val="50000"/>
+            </a:schemeClr>
+          </a:lnRef>
+          <a:fillRef idx="1">
+            <a:schemeClr val="accent1"/>
+          </a:fillRef>
+          <a:effectRef idx="0">
+            <a:schemeClr val="accent1"/>
+          </a:effectRef>
+          <a:fontRef idx="minor">
+            <a:schemeClr val="lt1"/>
+          </a:fontRef>
+        </p:style>
+        <p:txBody>
+          <a:bodyPr rtlCol="0" anchor="ctr"/>
+          <a:lstStyle/>
+          <a:p>
+            <a:pPr algn="ctr"/>
+            <a:endParaRPr lang="en-US"/>
+          </a:p>
+        </p:txBody>
+      </p:sp>
     </p:spTree>
     <p:extLst>
       <p:ext uri="{BB962C8B-B14F-4D97-AF65-F5344CB8AC3E}">
-        <p14:creationId xmlns:p14="http://schemas.microsoft.com/office/powerpoint/2010/main" val="3494109170"/>
+        <p14:creationId xmlns:p14="http://schemas.microsoft.com/office/powerpoint/2010/main" val="1061620391"/>
       </p:ext>
     </p:extLst>
   </p:cSld>
@@ -7865,7 +8094,7 @@
           <p:cNvPr id="2" name="Title 1">
             <a:extLst>
               <a:ext uri="{FF2B5EF4-FFF2-40B4-BE49-F238E27FC236}">
-                <a16:creationId xmlns:a16="http://schemas.microsoft.com/office/drawing/2014/main" id="{0BC0547C-B14A-408C-8CF2-4607049B1F24}"/>
+                <a16:creationId xmlns:a16="http://schemas.microsoft.com/office/drawing/2014/main" id="{FEECFF2B-5B29-48D9-B2ED-38C67F117607}"/>
               </a:ext>
             </a:extLst>
           </p:cNvPr>
@@ -7883,7 +8112,7 @@
           <a:p>
             <a:r>
               <a:rPr lang="en-US" dirty="0"/>
-              <a:t>Conclusions</a:t>
+              <a:t>Future work</a:t>
             </a:r>
           </a:p>
         </p:txBody>
@@ -7893,7 +8122,7 @@
           <p:cNvPr id="3" name="Content Placeholder 2">
             <a:extLst>
               <a:ext uri="{FF2B5EF4-FFF2-40B4-BE49-F238E27FC236}">
-                <a16:creationId xmlns:a16="http://schemas.microsoft.com/office/drawing/2014/main" id="{FF574E90-8DA5-4829-A940-8986E3C44CDD}"/>
+                <a16:creationId xmlns:a16="http://schemas.microsoft.com/office/drawing/2014/main" id="{895CFE86-4CE3-4459-B124-316B013C995C}"/>
               </a:ext>
             </a:extLst>
           </p:cNvPr>
@@ -7911,44 +8140,52 @@
           <a:p>
             <a:r>
               <a:rPr lang="en-US" dirty="0"/>
-              <a:t>Engineered data from the acoustic data assist the prediction of the upcoming laboratory earthquake</a:t>
+              <a:t>Improve feature engineering</a:t>
             </a:r>
           </a:p>
           <a:p>
             <a:r>
               <a:rPr lang="en-US" dirty="0"/>
-              <a:t>Tree-based model and ensemble methods predict the trend of time-to-failure with a mean </a:t>
-            </a:r>
-            <a:r>
-              <a:rPr lang="en-US" i="1" dirty="0"/>
-              <a:t>MAE</a:t>
-            </a:r>
+              <a:t>Employee the systematic error in validation</a:t>
+            </a:r>
+          </a:p>
+          <a:p>
             <a:r>
               <a:rPr lang="en-US" dirty="0"/>
-              <a:t> of 1.970 s through learning the nonlinear relationship between the features and targets</a:t>
+              <a:t>Deep/Recurrent neural network</a:t>
             </a:r>
           </a:p>
           <a:p>
             <a:r>
               <a:rPr lang="en-US" dirty="0"/>
-              <a:t>Blending regressor further improve the tested </a:t>
-            </a:r>
-            <a:r>
-              <a:rPr lang="en-US" i="1" dirty="0"/>
-              <a:t>MAE</a:t>
-            </a:r>
+              <a:t>Potential application</a:t>
+            </a:r>
+          </a:p>
+          <a:p>
+            <a:pPr lvl="1"/>
             <a:r>
               <a:rPr lang="en-US" dirty="0"/>
-              <a:t> and </a:t>
-            </a:r>
-            <a:r>
-              <a:rPr lang="en-US" i="1" dirty="0"/>
-              <a:t>R</a:t>
-            </a:r>
-            <a:r>
-              <a:rPr lang="en-US" i="1" baseline="30000" dirty="0"/>
+              <a:t>Cell phone app for the science lovers</a:t>
+            </a:r>
+          </a:p>
+          <a:p>
+            <a:pPr lvl="1"/>
+            <a:r>
+              <a:rPr lang="en-US" dirty="0"/>
+              <a:t>Monitor storage site safety: nuclear waste, CO</a:t>
+            </a:r>
+            <a:r>
+              <a:rPr lang="en-US" baseline="-25000" dirty="0"/>
               <a:t>2</a:t>
             </a:r>
+            <a:r>
+              <a:rPr lang="en-US" dirty="0"/>
+              <a:t> reservoir</a:t>
+            </a:r>
+          </a:p>
+          <a:p>
+            <a:pPr lvl="1"/>
+            <a:endParaRPr lang="en-US" dirty="0"/>
           </a:p>
         </p:txBody>
       </p:sp>
@@ -7957,7 +8194,7 @@
           <p:cNvPr id="4" name="Slide Number Placeholder 3">
             <a:extLst>
               <a:ext uri="{FF2B5EF4-FFF2-40B4-BE49-F238E27FC236}">
-                <a16:creationId xmlns:a16="http://schemas.microsoft.com/office/drawing/2014/main" id="{DEE97015-DDF5-4971-8F67-A2ED252915E2}"/>
+                <a16:creationId xmlns:a16="http://schemas.microsoft.com/office/drawing/2014/main" id="{5440C170-1DE6-4C05-8881-B8C7D45DCF2C}"/>
               </a:ext>
             </a:extLst>
           </p:cNvPr>
@@ -7985,7 +8222,7 @@
     </p:spTree>
     <p:extLst>
       <p:ext uri="{BB962C8B-B14F-4D97-AF65-F5344CB8AC3E}">
-        <p14:creationId xmlns:p14="http://schemas.microsoft.com/office/powerpoint/2010/main" val="763533692"/>
+        <p14:creationId xmlns:p14="http://schemas.microsoft.com/office/powerpoint/2010/main" val="3494109170"/>
       </p:ext>
     </p:extLst>
   </p:cSld>
@@ -8017,7 +8254,7 @@
           <p:cNvPr id="2" name="Title 1">
             <a:extLst>
               <a:ext uri="{FF2B5EF4-FFF2-40B4-BE49-F238E27FC236}">
-                <a16:creationId xmlns:a16="http://schemas.microsoft.com/office/drawing/2014/main" id="{495DD602-D6BC-4A03-90C9-EBCE1CF65827}"/>
+                <a16:creationId xmlns:a16="http://schemas.microsoft.com/office/drawing/2014/main" id="{0BC0547C-B14A-408C-8CF2-4607049B1F24}"/>
               </a:ext>
             </a:extLst>
           </p:cNvPr>
@@ -8035,7 +8272,7 @@
           <a:p>
             <a:r>
               <a:rPr lang="en-US" dirty="0"/>
-              <a:t>Acknowledgements</a:t>
+              <a:t>Conclusions</a:t>
             </a:r>
           </a:p>
         </p:txBody>
@@ -8045,7 +8282,7 @@
           <p:cNvPr id="3" name="Content Placeholder 2">
             <a:extLst>
               <a:ext uri="{FF2B5EF4-FFF2-40B4-BE49-F238E27FC236}">
-                <a16:creationId xmlns:a16="http://schemas.microsoft.com/office/drawing/2014/main" id="{6E58903D-216E-4285-BAD8-91BD2DC6EA48}"/>
+                <a16:creationId xmlns:a16="http://schemas.microsoft.com/office/drawing/2014/main" id="{FF574E90-8DA5-4829-A940-8986E3C44CDD}"/>
               </a:ext>
             </a:extLst>
           </p:cNvPr>
@@ -8063,13 +8300,43 @@
           <a:p>
             <a:r>
               <a:rPr lang="en-US" dirty="0"/>
-              <a:t>Los Alamos National Laboratory</a:t>
+              <a:t>Engineered data from the acoustic data assist the prediction of the upcoming laboratory earthquake</a:t>
             </a:r>
           </a:p>
           <a:p>
             <a:r>
               <a:rPr lang="en-US" dirty="0"/>
-              <a:t>Kaggle platform</a:t>
+              <a:t>Tree-based model and ensemble methods predict the trend of time-to-failure with a </a:t>
+            </a:r>
+            <a:r>
+              <a:rPr lang="en-US" i="1" dirty="0"/>
+              <a:t>MAE</a:t>
+            </a:r>
+            <a:r>
+              <a:rPr lang="en-US" dirty="0"/>
+              <a:t> of 1.970 s through learning the nonlinear relationship between the features and targets</a:t>
+            </a:r>
+          </a:p>
+          <a:p>
+            <a:r>
+              <a:rPr lang="en-US" dirty="0"/>
+              <a:t>Blending regressor further improves the tested </a:t>
+            </a:r>
+            <a:r>
+              <a:rPr lang="en-US" i="1" dirty="0"/>
+              <a:t>MAE</a:t>
+            </a:r>
+            <a:r>
+              <a:rPr lang="en-US" dirty="0"/>
+              <a:t> and </a:t>
+            </a:r>
+            <a:r>
+              <a:rPr lang="en-US" i="1" dirty="0"/>
+              <a:t>R</a:t>
+            </a:r>
+            <a:r>
+              <a:rPr lang="en-US" i="1" baseline="30000" dirty="0"/>
+              <a:t>2</a:t>
             </a:r>
           </a:p>
         </p:txBody>
@@ -8079,7 +8346,7 @@
           <p:cNvPr id="4" name="Slide Number Placeholder 3">
             <a:extLst>
               <a:ext uri="{FF2B5EF4-FFF2-40B4-BE49-F238E27FC236}">
-                <a16:creationId xmlns:a16="http://schemas.microsoft.com/office/drawing/2014/main" id="{5A3367DD-768B-49A0-80C2-901BBF7B72C0}"/>
+                <a16:creationId xmlns:a16="http://schemas.microsoft.com/office/drawing/2014/main" id="{DEE97015-DDF5-4971-8F67-A2ED252915E2}"/>
               </a:ext>
             </a:extLst>
           </p:cNvPr>
@@ -8099,6 +8366,128 @@
               <a:rPr lang="en-US" smtClean="0"/>
               <a:pPr/>
               <a:t>18</a:t>
+            </a:fld>
+            <a:endParaRPr lang="en-US"/>
+          </a:p>
+        </p:txBody>
+      </p:sp>
+    </p:spTree>
+    <p:extLst>
+      <p:ext uri="{BB962C8B-B14F-4D97-AF65-F5344CB8AC3E}">
+        <p14:creationId xmlns:p14="http://schemas.microsoft.com/office/powerpoint/2010/main" val="763533692"/>
+      </p:ext>
+    </p:extLst>
+  </p:cSld>
+  <p:clrMapOvr>
+    <a:masterClrMapping/>
+  </p:clrMapOvr>
+</p:sld>
+</file>
+
+<file path=ppt/slides/slide19.xml><?xml version="1.0" encoding="utf-8"?>
+<p:sld xmlns:a="http://schemas.openxmlformats.org/drawingml/2006/main" xmlns:r="http://schemas.openxmlformats.org/officeDocument/2006/relationships" xmlns:p="http://schemas.openxmlformats.org/presentationml/2006/main">
+  <p:cSld>
+    <p:spTree>
+      <p:nvGrpSpPr>
+        <p:cNvPr id="1" name=""/>
+        <p:cNvGrpSpPr/>
+        <p:nvPr/>
+      </p:nvGrpSpPr>
+      <p:grpSpPr>
+        <a:xfrm>
+          <a:off x="0" y="0"/>
+          <a:ext cx="0" cy="0"/>
+          <a:chOff x="0" y="0"/>
+          <a:chExt cx="0" cy="0"/>
+        </a:xfrm>
+      </p:grpSpPr>
+      <p:sp>
+        <p:nvSpPr>
+          <p:cNvPr id="2" name="Title 1">
+            <a:extLst>
+              <a:ext uri="{FF2B5EF4-FFF2-40B4-BE49-F238E27FC236}">
+                <a16:creationId xmlns:a16="http://schemas.microsoft.com/office/drawing/2014/main" id="{495DD602-D6BC-4A03-90C9-EBCE1CF65827}"/>
+              </a:ext>
+            </a:extLst>
+          </p:cNvPr>
+          <p:cNvSpPr>
+            <a:spLocks noGrp="1"/>
+          </p:cNvSpPr>
+          <p:nvPr>
+            <p:ph type="title"/>
+          </p:nvPr>
+        </p:nvSpPr>
+        <p:spPr/>
+        <p:txBody>
+          <a:bodyPr/>
+          <a:lstStyle/>
+          <a:p>
+            <a:r>
+              <a:rPr lang="en-US" dirty="0"/>
+              <a:t>Acknowledgements</a:t>
+            </a:r>
+          </a:p>
+        </p:txBody>
+      </p:sp>
+      <p:sp>
+        <p:nvSpPr>
+          <p:cNvPr id="3" name="Content Placeholder 2">
+            <a:extLst>
+              <a:ext uri="{FF2B5EF4-FFF2-40B4-BE49-F238E27FC236}">
+                <a16:creationId xmlns:a16="http://schemas.microsoft.com/office/drawing/2014/main" id="{6E58903D-216E-4285-BAD8-91BD2DC6EA48}"/>
+              </a:ext>
+            </a:extLst>
+          </p:cNvPr>
+          <p:cNvSpPr>
+            <a:spLocks noGrp="1"/>
+          </p:cNvSpPr>
+          <p:nvPr>
+            <p:ph idx="1"/>
+          </p:nvPr>
+        </p:nvSpPr>
+        <p:spPr/>
+        <p:txBody>
+          <a:bodyPr/>
+          <a:lstStyle/>
+          <a:p>
+            <a:r>
+              <a:rPr lang="en-US" dirty="0"/>
+              <a:t>Los Alamos National Laboratory</a:t>
+            </a:r>
+          </a:p>
+          <a:p>
+            <a:r>
+              <a:rPr lang="en-US" dirty="0"/>
+              <a:t>Kaggle platform</a:t>
+            </a:r>
+          </a:p>
+        </p:txBody>
+      </p:sp>
+      <p:sp>
+        <p:nvSpPr>
+          <p:cNvPr id="4" name="Slide Number Placeholder 3">
+            <a:extLst>
+              <a:ext uri="{FF2B5EF4-FFF2-40B4-BE49-F238E27FC236}">
+                <a16:creationId xmlns:a16="http://schemas.microsoft.com/office/drawing/2014/main" id="{5A3367DD-768B-49A0-80C2-901BBF7B72C0}"/>
+              </a:ext>
+            </a:extLst>
+          </p:cNvPr>
+          <p:cNvSpPr>
+            <a:spLocks noGrp="1"/>
+          </p:cNvSpPr>
+          <p:nvPr>
+            <p:ph type="sldNum" sz="quarter" idx="12"/>
+          </p:nvPr>
+        </p:nvSpPr>
+        <p:spPr/>
+        <p:txBody>
+          <a:bodyPr/>
+          <a:lstStyle/>
+          <a:p>
+            <a:fld id="{49F5416C-8930-4BBD-885C-EB544461BEF4}" type="slidenum">
+              <a:rPr lang="en-US" smtClean="0"/>
+              <a:pPr/>
+              <a:t>19</a:t>
             </a:fld>
             <a:endParaRPr lang="en-US"/>
           </a:p>
@@ -8117,7 +8506,236 @@
 </p:sld>
 </file>
 
-<file path=ppt/slides/slide19.xml><?xml version="1.0" encoding="utf-8"?>
+<file path=ppt/slides/slide2.xml><?xml version="1.0" encoding="utf-8"?>
+<p:sld xmlns:a="http://schemas.openxmlformats.org/drawingml/2006/main" xmlns:r="http://schemas.openxmlformats.org/officeDocument/2006/relationships" xmlns:p="http://schemas.openxmlformats.org/presentationml/2006/main">
+  <p:cSld>
+    <p:spTree>
+      <p:nvGrpSpPr>
+        <p:cNvPr id="1" name=""/>
+        <p:cNvGrpSpPr/>
+        <p:nvPr/>
+      </p:nvGrpSpPr>
+      <p:grpSpPr>
+        <a:xfrm>
+          <a:off x="0" y="0"/>
+          <a:ext cx="0" cy="0"/>
+          <a:chOff x="0" y="0"/>
+          <a:chExt cx="0" cy="0"/>
+        </a:xfrm>
+      </p:grpSpPr>
+      <p:sp>
+        <p:nvSpPr>
+          <p:cNvPr id="2" name="Title 1">
+            <a:extLst>
+              <a:ext uri="{FF2B5EF4-FFF2-40B4-BE49-F238E27FC236}">
+                <a16:creationId xmlns:a16="http://schemas.microsoft.com/office/drawing/2014/main" id="{734ABD27-F5EF-43E0-8602-596865853C78}"/>
+              </a:ext>
+            </a:extLst>
+          </p:cNvPr>
+          <p:cNvSpPr>
+            <a:spLocks noGrp="1"/>
+          </p:cNvSpPr>
+          <p:nvPr>
+            <p:ph type="title"/>
+          </p:nvPr>
+        </p:nvSpPr>
+        <p:spPr/>
+        <p:txBody>
+          <a:bodyPr/>
+          <a:lstStyle/>
+          <a:p>
+            <a:r>
+              <a:rPr lang="en-US" dirty="0"/>
+              <a:t>Background</a:t>
+            </a:r>
+          </a:p>
+        </p:txBody>
+      </p:sp>
+      <p:sp>
+        <p:nvSpPr>
+          <p:cNvPr id="3" name="Content Placeholder 2">
+            <a:extLst>
+              <a:ext uri="{FF2B5EF4-FFF2-40B4-BE49-F238E27FC236}">
+                <a16:creationId xmlns:a16="http://schemas.microsoft.com/office/drawing/2014/main" id="{5A0F386B-6AAF-45FD-AA7C-013C760BADE3}"/>
+              </a:ext>
+            </a:extLst>
+          </p:cNvPr>
+          <p:cNvSpPr>
+            <a:spLocks noGrp="1"/>
+          </p:cNvSpPr>
+          <p:nvPr>
+            <p:ph idx="1"/>
+          </p:nvPr>
+        </p:nvSpPr>
+        <p:spPr>
+          <a:xfrm>
+            <a:off x="838200" y="1825625"/>
+            <a:ext cx="6172200" cy="4351338"/>
+          </a:xfrm>
+        </p:spPr>
+        <p:txBody>
+          <a:bodyPr/>
+          <a:lstStyle/>
+          <a:p>
+            <a:r>
+              <a:rPr lang="en-US" dirty="0"/>
+              <a:t>Earthquake forecast is difficult</a:t>
+            </a:r>
+          </a:p>
+          <a:p>
+            <a:r>
+              <a:rPr lang="en-US" dirty="0"/>
+              <a:t>Empirical analysis versus physical principles</a:t>
+            </a:r>
+          </a:p>
+          <a:p>
+            <a:r>
+              <a:rPr lang="en-US" dirty="0"/>
+              <a:t>Slow earthquake</a:t>
+            </a:r>
+          </a:p>
+          <a:p>
+            <a:pPr lvl="1"/>
+            <a:r>
+              <a:rPr lang="en-US" dirty="0"/>
+              <a:t>Found in recent twenty years</a:t>
+            </a:r>
+          </a:p>
+          <a:p>
+            <a:pPr lvl="1"/>
+            <a:r>
+              <a:rPr lang="en-US" dirty="0"/>
+              <a:t>Releasing energy slowly</a:t>
+            </a:r>
+          </a:p>
+          <a:p>
+            <a:pPr lvl="1"/>
+            <a:r>
+              <a:rPr lang="en-US" dirty="0"/>
+              <a:t>A wide spectrum of stick-slip </a:t>
+            </a:r>
+          </a:p>
+          <a:p>
+            <a:pPr lvl="1"/>
+            <a:r>
+              <a:rPr lang="en-US" dirty="0"/>
+              <a:t>Providing insights into traditional earthquakes</a:t>
+            </a:r>
+          </a:p>
+        </p:txBody>
+      </p:sp>
+      <p:sp>
+        <p:nvSpPr>
+          <p:cNvPr id="14" name="Slide Number Placeholder 13">
+            <a:extLst>
+              <a:ext uri="{FF2B5EF4-FFF2-40B4-BE49-F238E27FC236}">
+                <a16:creationId xmlns:a16="http://schemas.microsoft.com/office/drawing/2014/main" id="{C2551F39-AE29-48BD-A8C9-50D69832C169}"/>
+              </a:ext>
+            </a:extLst>
+          </p:cNvPr>
+          <p:cNvSpPr>
+            <a:spLocks noGrp="1"/>
+          </p:cNvSpPr>
+          <p:nvPr>
+            <p:ph type="sldNum" sz="quarter" idx="12"/>
+          </p:nvPr>
+        </p:nvSpPr>
+        <p:spPr/>
+        <p:txBody>
+          <a:bodyPr/>
+          <a:lstStyle/>
+          <a:p>
+            <a:fld id="{49F5416C-8930-4BBD-885C-EB544461BEF4}" type="slidenum">
+              <a:rPr lang="en-US" smtClean="0"/>
+              <a:pPr/>
+              <a:t>2</a:t>
+            </a:fld>
+            <a:endParaRPr lang="en-US" dirty="0"/>
+          </a:p>
+        </p:txBody>
+      </p:sp>
+      <p:pic>
+        <p:nvPicPr>
+          <p:cNvPr id="19" name="Picture 18">
+            <a:extLst>
+              <a:ext uri="{FF2B5EF4-FFF2-40B4-BE49-F238E27FC236}">
+                <a16:creationId xmlns:a16="http://schemas.microsoft.com/office/drawing/2014/main" id="{7D6FAF4D-A634-4AC6-B340-561C0747C064}"/>
+              </a:ext>
+            </a:extLst>
+          </p:cNvPr>
+          <p:cNvPicPr>
+            <a:picLocks noChangeAspect="1"/>
+          </p:cNvPicPr>
+          <p:nvPr/>
+        </p:nvPicPr>
+        <p:blipFill>
+          <a:blip r:embed="rId3"/>
+          <a:stretch>
+            <a:fillRect/>
+          </a:stretch>
+        </p:blipFill>
+        <p:spPr>
+          <a:xfrm>
+            <a:off x="7010400" y="2281238"/>
+            <a:ext cx="4858738" cy="2733040"/>
+          </a:xfrm>
+          <a:prstGeom prst="rect">
+            <a:avLst/>
+          </a:prstGeom>
+        </p:spPr>
+      </p:pic>
+      <p:sp>
+        <p:nvSpPr>
+          <p:cNvPr id="20" name="TextBox 19">
+            <a:extLst>
+              <a:ext uri="{FF2B5EF4-FFF2-40B4-BE49-F238E27FC236}">
+                <a16:creationId xmlns:a16="http://schemas.microsoft.com/office/drawing/2014/main" id="{C63FC3B2-D6B1-4526-B139-97918594CE07}"/>
+              </a:ext>
+            </a:extLst>
+          </p:cNvPr>
+          <p:cNvSpPr txBox="1"/>
+          <p:nvPr/>
+        </p:nvSpPr>
+        <p:spPr>
+          <a:xfrm>
+            <a:off x="8229600" y="5041622"/>
+            <a:ext cx="2005677" cy="369332"/>
+          </a:xfrm>
+          <a:prstGeom prst="rect">
+            <a:avLst/>
+          </a:prstGeom>
+          <a:noFill/>
+        </p:spPr>
+        <p:txBody>
+          <a:bodyPr wrap="none" rtlCol="0">
+            <a:spAutoFit/>
+          </a:bodyPr>
+          <a:lstStyle/>
+          <a:p>
+            <a:r>
+              <a:rPr lang="en-US" dirty="0">
+                <a:latin typeface="Arial" panose="020B0604020202020204" pitchFamily="34" charset="0"/>
+                <a:cs typeface="Arial" panose="020B0604020202020204" pitchFamily="34" charset="0"/>
+              </a:rPr>
+              <a:t>So hard to predict</a:t>
+            </a:r>
+          </a:p>
+        </p:txBody>
+      </p:sp>
+    </p:spTree>
+    <p:extLst>
+      <p:ext uri="{BB962C8B-B14F-4D97-AF65-F5344CB8AC3E}">
+        <p14:creationId xmlns:p14="http://schemas.microsoft.com/office/powerpoint/2010/main" val="1227073797"/>
+      </p:ext>
+    </p:extLst>
+  </p:cSld>
+  <p:clrMapOvr>
+    <a:masterClrMapping/>
+  </p:clrMapOvr>
+</p:sld>
+</file>
+
+<file path=ppt/slides/slide20.xml><?xml version="1.0" encoding="utf-8"?>
 <p:sld xmlns:a="http://schemas.openxmlformats.org/drawingml/2006/main" xmlns:r="http://schemas.openxmlformats.org/officeDocument/2006/relationships" xmlns:p="http://schemas.openxmlformats.org/presentationml/2006/main" show="0">
   <p:cSld>
     <p:spTree>
@@ -8246,7 +8864,7 @@
             <a:fld id="{49F5416C-8930-4BBD-885C-EB544461BEF4}" type="slidenum">
               <a:rPr lang="en-US" smtClean="0"/>
               <a:pPr/>
-              <a:t>19</a:t>
+              <a:t>20</a:t>
             </a:fld>
             <a:endParaRPr lang="en-US"/>
           </a:p>
@@ -8372,235 +8990,6 @@
 </p:sld>
 </file>
 
-<file path=ppt/slides/slide2.xml><?xml version="1.0" encoding="utf-8"?>
-<p:sld xmlns:a="http://schemas.openxmlformats.org/drawingml/2006/main" xmlns:r="http://schemas.openxmlformats.org/officeDocument/2006/relationships" xmlns:p="http://schemas.openxmlformats.org/presentationml/2006/main">
-  <p:cSld>
-    <p:spTree>
-      <p:nvGrpSpPr>
-        <p:cNvPr id="1" name=""/>
-        <p:cNvGrpSpPr/>
-        <p:nvPr/>
-      </p:nvGrpSpPr>
-      <p:grpSpPr>
-        <a:xfrm>
-          <a:off x="0" y="0"/>
-          <a:ext cx="0" cy="0"/>
-          <a:chOff x="0" y="0"/>
-          <a:chExt cx="0" cy="0"/>
-        </a:xfrm>
-      </p:grpSpPr>
-      <p:sp>
-        <p:nvSpPr>
-          <p:cNvPr id="2" name="Title 1">
-            <a:extLst>
-              <a:ext uri="{FF2B5EF4-FFF2-40B4-BE49-F238E27FC236}">
-                <a16:creationId xmlns:a16="http://schemas.microsoft.com/office/drawing/2014/main" id="{734ABD27-F5EF-43E0-8602-596865853C78}"/>
-              </a:ext>
-            </a:extLst>
-          </p:cNvPr>
-          <p:cNvSpPr>
-            <a:spLocks noGrp="1"/>
-          </p:cNvSpPr>
-          <p:nvPr>
-            <p:ph type="title"/>
-          </p:nvPr>
-        </p:nvSpPr>
-        <p:spPr/>
-        <p:txBody>
-          <a:bodyPr/>
-          <a:lstStyle/>
-          <a:p>
-            <a:r>
-              <a:rPr lang="en-US" dirty="0"/>
-              <a:t>Background</a:t>
-            </a:r>
-          </a:p>
-        </p:txBody>
-      </p:sp>
-      <p:sp>
-        <p:nvSpPr>
-          <p:cNvPr id="3" name="Content Placeholder 2">
-            <a:extLst>
-              <a:ext uri="{FF2B5EF4-FFF2-40B4-BE49-F238E27FC236}">
-                <a16:creationId xmlns:a16="http://schemas.microsoft.com/office/drawing/2014/main" id="{5A0F386B-6AAF-45FD-AA7C-013C760BADE3}"/>
-              </a:ext>
-            </a:extLst>
-          </p:cNvPr>
-          <p:cNvSpPr>
-            <a:spLocks noGrp="1"/>
-          </p:cNvSpPr>
-          <p:nvPr>
-            <p:ph idx="1"/>
-          </p:nvPr>
-        </p:nvSpPr>
-        <p:spPr>
-          <a:xfrm>
-            <a:off x="838200" y="1825625"/>
-            <a:ext cx="6172200" cy="4351338"/>
-          </a:xfrm>
-        </p:spPr>
-        <p:txBody>
-          <a:bodyPr/>
-          <a:lstStyle/>
-          <a:p>
-            <a:r>
-              <a:rPr lang="en-US" dirty="0"/>
-              <a:t>Earthquake forecast is difficult</a:t>
-            </a:r>
-          </a:p>
-          <a:p>
-            <a:r>
-              <a:rPr lang="en-US" dirty="0"/>
-              <a:t>Empirical analysis versus physical principles</a:t>
-            </a:r>
-          </a:p>
-          <a:p>
-            <a:r>
-              <a:rPr lang="en-US" dirty="0"/>
-              <a:t>Slow earthquake</a:t>
-            </a:r>
-          </a:p>
-          <a:p>
-            <a:pPr lvl="1"/>
-            <a:r>
-              <a:rPr lang="en-US" dirty="0"/>
-              <a:t>Found in recent twenty years</a:t>
-            </a:r>
-          </a:p>
-          <a:p>
-            <a:pPr lvl="1"/>
-            <a:r>
-              <a:rPr lang="en-US" dirty="0"/>
-              <a:t>Releasing energy slowly</a:t>
-            </a:r>
-          </a:p>
-          <a:p>
-            <a:pPr lvl="1"/>
-            <a:r>
-              <a:rPr lang="en-US" dirty="0"/>
-              <a:t>A wide spectrum of stick-slip </a:t>
-            </a:r>
-          </a:p>
-          <a:p>
-            <a:pPr lvl="1"/>
-            <a:r>
-              <a:rPr lang="en-US" dirty="0"/>
-              <a:t>Providing insights into traditional earthquakes</a:t>
-            </a:r>
-          </a:p>
-        </p:txBody>
-      </p:sp>
-      <p:sp>
-        <p:nvSpPr>
-          <p:cNvPr id="14" name="Slide Number Placeholder 13">
-            <a:extLst>
-              <a:ext uri="{FF2B5EF4-FFF2-40B4-BE49-F238E27FC236}">
-                <a16:creationId xmlns:a16="http://schemas.microsoft.com/office/drawing/2014/main" id="{C2551F39-AE29-48BD-A8C9-50D69832C169}"/>
-              </a:ext>
-            </a:extLst>
-          </p:cNvPr>
-          <p:cNvSpPr>
-            <a:spLocks noGrp="1"/>
-          </p:cNvSpPr>
-          <p:nvPr>
-            <p:ph type="sldNum" sz="quarter" idx="12"/>
-          </p:nvPr>
-        </p:nvSpPr>
-        <p:spPr/>
-        <p:txBody>
-          <a:bodyPr/>
-          <a:lstStyle/>
-          <a:p>
-            <a:fld id="{49F5416C-8930-4BBD-885C-EB544461BEF4}" type="slidenum">
-              <a:rPr lang="en-US" smtClean="0"/>
-              <a:pPr/>
-              <a:t>2</a:t>
-            </a:fld>
-            <a:endParaRPr lang="en-US" dirty="0"/>
-          </a:p>
-        </p:txBody>
-      </p:sp>
-      <p:pic>
-        <p:nvPicPr>
-          <p:cNvPr id="19" name="Picture 18">
-            <a:extLst>
-              <a:ext uri="{FF2B5EF4-FFF2-40B4-BE49-F238E27FC236}">
-                <a16:creationId xmlns:a16="http://schemas.microsoft.com/office/drawing/2014/main" id="{7D6FAF4D-A634-4AC6-B340-561C0747C064}"/>
-              </a:ext>
-            </a:extLst>
-          </p:cNvPr>
-          <p:cNvPicPr>
-            <a:picLocks noChangeAspect="1"/>
-          </p:cNvPicPr>
-          <p:nvPr/>
-        </p:nvPicPr>
-        <p:blipFill>
-          <a:blip r:embed="rId3"/>
-          <a:stretch>
-            <a:fillRect/>
-          </a:stretch>
-        </p:blipFill>
-        <p:spPr>
-          <a:xfrm>
-            <a:off x="7010400" y="2281238"/>
-            <a:ext cx="4858738" cy="2733040"/>
-          </a:xfrm>
-          <a:prstGeom prst="rect">
-            <a:avLst/>
-          </a:prstGeom>
-        </p:spPr>
-      </p:pic>
-      <p:sp>
-        <p:nvSpPr>
-          <p:cNvPr id="20" name="TextBox 19">
-            <a:extLst>
-              <a:ext uri="{FF2B5EF4-FFF2-40B4-BE49-F238E27FC236}">
-                <a16:creationId xmlns:a16="http://schemas.microsoft.com/office/drawing/2014/main" id="{C63FC3B2-D6B1-4526-B139-97918594CE07}"/>
-              </a:ext>
-            </a:extLst>
-          </p:cNvPr>
-          <p:cNvSpPr txBox="1"/>
-          <p:nvPr/>
-        </p:nvSpPr>
-        <p:spPr>
-          <a:xfrm>
-            <a:off x="8229600" y="5041622"/>
-            <a:ext cx="2005677" cy="369332"/>
-          </a:xfrm>
-          <a:prstGeom prst="rect">
-            <a:avLst/>
-          </a:prstGeom>
-          <a:noFill/>
-        </p:spPr>
-        <p:txBody>
-          <a:bodyPr wrap="none" rtlCol="0">
-            <a:spAutoFit/>
-          </a:bodyPr>
-          <a:lstStyle/>
-          <a:p>
-            <a:r>
-              <a:rPr lang="en-US" dirty="0">
-                <a:latin typeface="Arial" panose="020B0604020202020204" pitchFamily="34" charset="0"/>
-                <a:cs typeface="Arial" panose="020B0604020202020204" pitchFamily="34" charset="0"/>
-              </a:rPr>
-              <a:t>So hard to predict</a:t>
-            </a:r>
-          </a:p>
-        </p:txBody>
-      </p:sp>
-    </p:spTree>
-    <p:extLst>
-      <p:ext uri="{BB962C8B-B14F-4D97-AF65-F5344CB8AC3E}">
-        <p14:creationId xmlns:p14="http://schemas.microsoft.com/office/powerpoint/2010/main" val="1227073797"/>
-      </p:ext>
-    </p:extLst>
-  </p:cSld>
-  <p:clrMapOvr>
-    <a:masterClrMapping/>
-  </p:clrMapOvr>
-</p:sld>
-</file>
-
 <file path=ppt/slides/slide3.xml><?xml version="1.0" encoding="utf-8"?>
 <p:sld xmlns:a="http://schemas.openxmlformats.org/drawingml/2006/main" xmlns:r="http://schemas.openxmlformats.org/officeDocument/2006/relationships" xmlns:p="http://schemas.openxmlformats.org/presentationml/2006/main">
   <p:cSld>
@@ -8939,6 +9328,92 @@
   <p:clrMapOvr>
     <a:masterClrMapping/>
   </p:clrMapOvr>
+  <p:timing>
+    <p:tnLst>
+      <p:par>
+        <p:cTn id="1" dur="indefinite" restart="never" nodeType="tmRoot">
+          <p:childTnLst>
+            <p:seq concurrent="1" nextAc="seek">
+              <p:cTn id="2" dur="indefinite" nodeType="mainSeq">
+                <p:childTnLst>
+                  <p:par>
+                    <p:cTn id="3" fill="hold">
+                      <p:stCondLst>
+                        <p:cond delay="indefinite"/>
+                      </p:stCondLst>
+                      <p:childTnLst>
+                        <p:par>
+                          <p:cTn id="4" fill="hold">
+                            <p:stCondLst>
+                              <p:cond delay="0"/>
+                            </p:stCondLst>
+                            <p:childTnLst>
+                              <p:par>
+                                <p:cTn id="5" presetID="10" presetClass="entr" presetSubtype="0" fill="hold" grpId="0" nodeType="clickEffect">
+                                  <p:stCondLst>
+                                    <p:cond delay="0"/>
+                                  </p:stCondLst>
+                                  <p:childTnLst>
+                                    <p:set>
+                                      <p:cBhvr>
+                                        <p:cTn id="6" dur="1" fill="hold">
+                                          <p:stCondLst>
+                                            <p:cond delay="0"/>
+                                          </p:stCondLst>
+                                        </p:cTn>
+                                        <p:tgtEl>
+                                          <p:spTgt spid="8"/>
+                                        </p:tgtEl>
+                                        <p:attrNameLst>
+                                          <p:attrName>style.visibility</p:attrName>
+                                        </p:attrNameLst>
+                                      </p:cBhvr>
+                                      <p:to>
+                                        <p:strVal val="visible"/>
+                                      </p:to>
+                                    </p:set>
+                                    <p:animEffect transition="in" filter="fade">
+                                      <p:cBhvr>
+                                        <p:cTn id="7" dur="500"/>
+                                        <p:tgtEl>
+                                          <p:spTgt spid="8"/>
+                                        </p:tgtEl>
+                                      </p:cBhvr>
+                                    </p:animEffect>
+                                  </p:childTnLst>
+                                </p:cTn>
+                              </p:par>
+                            </p:childTnLst>
+                          </p:cTn>
+                        </p:par>
+                      </p:childTnLst>
+                    </p:cTn>
+                  </p:par>
+                </p:childTnLst>
+              </p:cTn>
+              <p:prevCondLst>
+                <p:cond evt="onPrev" delay="0">
+                  <p:tgtEl>
+                    <p:sldTgt/>
+                  </p:tgtEl>
+                </p:cond>
+              </p:prevCondLst>
+              <p:nextCondLst>
+                <p:cond evt="onNext" delay="0">
+                  <p:tgtEl>
+                    <p:sldTgt/>
+                  </p:tgtEl>
+                </p:cond>
+              </p:nextCondLst>
+            </p:seq>
+          </p:childTnLst>
+        </p:cTn>
+      </p:par>
+    </p:tnLst>
+    <p:bldLst>
+      <p:bldP spid="8" grpId="0"/>
+    </p:bldLst>
+  </p:timing>
 </p:sld>
 </file>
 
@@ -10889,11 +11364,19 @@
             <a:pPr lvl="2"/>
             <a:r>
               <a:rPr lang="en-US" dirty="0"/>
-              <a:t>Min, max, mean, percentile, etc.</a:t>
-            </a:r>
-          </a:p>
-          <a:p>
-            <a:pPr lvl="1"/>
+              <a:t>Min, max, mean, </a:t>
+            </a:r>
+            <a:r>
+              <a:rPr lang="en-US" dirty="0" err="1"/>
+              <a:t>kurt</a:t>
+            </a:r>
+            <a:r>
+              <a:rPr lang="en-US" dirty="0"/>
+              <a:t>, skew, percentile</a:t>
+            </a:r>
+          </a:p>
+          <a:p>
+            <a:pPr lvl="2"/>
             <a:r>
               <a:rPr lang="en-US" dirty="0"/>
               <a:t>Rolling statistics (rolling functions + statistics)</a:t>
@@ -11331,7 +11814,7 @@
           <a:bodyPr/>
           <a:lstStyle/>
           <a:p>
-            <a:endParaRPr lang="en-US"/>
+            <a:endParaRPr lang="en-US" dirty="0"/>
           </a:p>
         </p:txBody>
       </p:sp>
@@ -11412,12 +11895,130 @@
           </a:extLst>
         </p:spPr>
       </p:pic>
+      <p:sp>
+        <p:nvSpPr>
+          <p:cNvPr id="6" name="TextBox 5">
+            <a:extLst>
+              <a:ext uri="{FF2B5EF4-FFF2-40B4-BE49-F238E27FC236}">
+                <a16:creationId xmlns:a16="http://schemas.microsoft.com/office/drawing/2014/main" id="{382FB3FA-3D8B-409C-84A5-09E28AF8D483}"/>
+              </a:ext>
+            </a:extLst>
+          </p:cNvPr>
+          <p:cNvSpPr txBox="1"/>
+          <p:nvPr/>
+        </p:nvSpPr>
+        <p:spPr>
+          <a:xfrm>
+            <a:off x="2349795" y="5785239"/>
+            <a:ext cx="1697901" cy="369332"/>
+          </a:xfrm>
+          <a:prstGeom prst="rect">
+            <a:avLst/>
+          </a:prstGeom>
+          <a:noFill/>
+        </p:spPr>
+        <p:txBody>
+          <a:bodyPr wrap="none" rtlCol="0">
+            <a:spAutoFit/>
+          </a:bodyPr>
+          <a:lstStyle/>
+          <a:p>
+            <a:r>
+              <a:rPr lang="en-US" dirty="0">
+                <a:latin typeface="Arial" panose="020B0604020202020204" pitchFamily="34" charset="0"/>
+                <a:cs typeface="Arial" panose="020B0604020202020204" pitchFamily="34" charset="0"/>
+              </a:rPr>
+              <a:t>t-SNE analysis</a:t>
+            </a:r>
+          </a:p>
+        </p:txBody>
+      </p:sp>
+      <p:sp>
+        <p:nvSpPr>
+          <p:cNvPr id="8" name="TextBox 7">
+            <a:extLst>
+              <a:ext uri="{FF2B5EF4-FFF2-40B4-BE49-F238E27FC236}">
+                <a16:creationId xmlns:a16="http://schemas.microsoft.com/office/drawing/2014/main" id="{B6BD7D01-616F-420D-9704-7BF67AB87334}"/>
+              </a:ext>
+            </a:extLst>
+          </p:cNvPr>
+          <p:cNvSpPr txBox="1"/>
+          <p:nvPr/>
+        </p:nvSpPr>
+        <p:spPr>
+          <a:xfrm>
+            <a:off x="9116528" y="5415907"/>
+            <a:ext cx="659155" cy="369332"/>
+          </a:xfrm>
+          <a:prstGeom prst="rect">
+            <a:avLst/>
+          </a:prstGeom>
+          <a:noFill/>
+        </p:spPr>
+        <p:txBody>
+          <a:bodyPr wrap="none" rtlCol="0">
+            <a:spAutoFit/>
+          </a:bodyPr>
+          <a:lstStyle/>
+          <a:p>
+            <a:r>
+              <a:rPr lang="en-US" dirty="0">
+                <a:latin typeface="Arial" panose="020B0604020202020204" pitchFamily="34" charset="0"/>
+                <a:cs typeface="Arial" panose="020B0604020202020204" pitchFamily="34" charset="0"/>
+              </a:rPr>
+              <a:t>PCA</a:t>
+            </a:r>
+          </a:p>
+        </p:txBody>
+      </p:sp>
+      <p:sp>
+        <p:nvSpPr>
+          <p:cNvPr id="7" name="TextBox 6">
+            <a:extLst>
+              <a:ext uri="{FF2B5EF4-FFF2-40B4-BE49-F238E27FC236}">
+                <a16:creationId xmlns:a16="http://schemas.microsoft.com/office/drawing/2014/main" id="{6394698F-6983-4620-9E54-3D068CFD7D07}"/>
+              </a:ext>
+            </a:extLst>
+          </p:cNvPr>
+          <p:cNvSpPr txBox="1"/>
+          <p:nvPr/>
+        </p:nvSpPr>
+        <p:spPr>
+          <a:xfrm>
+            <a:off x="5454502" y="1646238"/>
+            <a:ext cx="377026" cy="369332"/>
+          </a:xfrm>
+          <a:prstGeom prst="rect">
+            <a:avLst/>
+          </a:prstGeom>
+          <a:noFill/>
+        </p:spPr>
+        <p:txBody>
+          <a:bodyPr wrap="none" rtlCol="0">
+            <a:spAutoFit/>
+          </a:bodyPr>
+          <a:lstStyle/>
+          <a:p>
+            <a:r>
+              <a:rPr lang="en-US" dirty="0" err="1">
+                <a:latin typeface="Arial" panose="020B0604020202020204" pitchFamily="34" charset="0"/>
+                <a:cs typeface="Arial" panose="020B0604020202020204" pitchFamily="34" charset="0"/>
+              </a:rPr>
+              <a:t>ttf</a:t>
+            </a:r>
+            <a:endParaRPr lang="en-US" dirty="0">
+              <a:latin typeface="Arial" panose="020B0604020202020204" pitchFamily="34" charset="0"/>
+              <a:cs typeface="Arial" panose="020B0604020202020204" pitchFamily="34" charset="0"/>
+            </a:endParaRPr>
+          </a:p>
+        </p:txBody>
+      </p:sp>
       <p:pic>
         <p:nvPicPr>
-          <p:cNvPr id="5" name="Picture 4">
-            <a:extLst>
-              <a:ext uri="{FF2B5EF4-FFF2-40B4-BE49-F238E27FC236}">
-                <a16:creationId xmlns:a16="http://schemas.microsoft.com/office/drawing/2014/main" id="{333624D3-CC13-4388-B813-A11ABFE32516}"/>
+          <p:cNvPr id="9" name="Picture 8">
+            <a:extLst>
+              <a:ext uri="{FF2B5EF4-FFF2-40B4-BE49-F238E27FC236}">
+                <a16:creationId xmlns:a16="http://schemas.microsoft.com/office/drawing/2014/main" id="{27F6A6E0-6AD2-97FA-61A7-62DE9A2BDEAF}"/>
               </a:ext>
             </a:extLst>
           </p:cNvPr>
@@ -11434,132 +12035,14 @@
         </p:blipFill>
         <p:spPr>
           <a:xfrm>
-            <a:off x="6600826" y="2408273"/>
-            <a:ext cx="5591174" cy="2757487"/>
+            <a:off x="6458356" y="2111903"/>
+            <a:ext cx="5486400" cy="3169067"/>
           </a:xfrm>
           <a:prstGeom prst="rect">
             <a:avLst/>
           </a:prstGeom>
         </p:spPr>
       </p:pic>
-      <p:sp>
-        <p:nvSpPr>
-          <p:cNvPr id="6" name="TextBox 5">
-            <a:extLst>
-              <a:ext uri="{FF2B5EF4-FFF2-40B4-BE49-F238E27FC236}">
-                <a16:creationId xmlns:a16="http://schemas.microsoft.com/office/drawing/2014/main" id="{382FB3FA-3D8B-409C-84A5-09E28AF8D483}"/>
-              </a:ext>
-            </a:extLst>
-          </p:cNvPr>
-          <p:cNvSpPr txBox="1"/>
-          <p:nvPr/>
-        </p:nvSpPr>
-        <p:spPr>
-          <a:xfrm>
-            <a:off x="2349795" y="5785239"/>
-            <a:ext cx="1697901" cy="369332"/>
-          </a:xfrm>
-          <a:prstGeom prst="rect">
-            <a:avLst/>
-          </a:prstGeom>
-          <a:noFill/>
-        </p:spPr>
-        <p:txBody>
-          <a:bodyPr wrap="none" rtlCol="0">
-            <a:spAutoFit/>
-          </a:bodyPr>
-          <a:lstStyle/>
-          <a:p>
-            <a:r>
-              <a:rPr lang="en-US" dirty="0">
-                <a:latin typeface="Arial" panose="020B0604020202020204" pitchFamily="34" charset="0"/>
-                <a:cs typeface="Arial" panose="020B0604020202020204" pitchFamily="34" charset="0"/>
-              </a:rPr>
-              <a:t>t-SNE analysis</a:t>
-            </a:r>
-          </a:p>
-        </p:txBody>
-      </p:sp>
-      <p:sp>
-        <p:nvSpPr>
-          <p:cNvPr id="8" name="TextBox 7">
-            <a:extLst>
-              <a:ext uri="{FF2B5EF4-FFF2-40B4-BE49-F238E27FC236}">
-                <a16:creationId xmlns:a16="http://schemas.microsoft.com/office/drawing/2014/main" id="{B6BD7D01-616F-420D-9704-7BF67AB87334}"/>
-              </a:ext>
-            </a:extLst>
-          </p:cNvPr>
-          <p:cNvSpPr txBox="1"/>
-          <p:nvPr/>
-        </p:nvSpPr>
-        <p:spPr>
-          <a:xfrm>
-            <a:off x="9116528" y="5415907"/>
-            <a:ext cx="659155" cy="369332"/>
-          </a:xfrm>
-          <a:prstGeom prst="rect">
-            <a:avLst/>
-          </a:prstGeom>
-          <a:noFill/>
-        </p:spPr>
-        <p:txBody>
-          <a:bodyPr wrap="none" rtlCol="0">
-            <a:spAutoFit/>
-          </a:bodyPr>
-          <a:lstStyle/>
-          <a:p>
-            <a:r>
-              <a:rPr lang="en-US" dirty="0">
-                <a:latin typeface="Arial" panose="020B0604020202020204" pitchFamily="34" charset="0"/>
-                <a:cs typeface="Arial" panose="020B0604020202020204" pitchFamily="34" charset="0"/>
-              </a:rPr>
-              <a:t>PCA</a:t>
-            </a:r>
-          </a:p>
-        </p:txBody>
-      </p:sp>
-      <p:sp>
-        <p:nvSpPr>
-          <p:cNvPr id="7" name="TextBox 6">
-            <a:extLst>
-              <a:ext uri="{FF2B5EF4-FFF2-40B4-BE49-F238E27FC236}">
-                <a16:creationId xmlns:a16="http://schemas.microsoft.com/office/drawing/2014/main" id="{6394698F-6983-4620-9E54-3D068CFD7D07}"/>
-              </a:ext>
-            </a:extLst>
-          </p:cNvPr>
-          <p:cNvSpPr txBox="1"/>
-          <p:nvPr/>
-        </p:nvSpPr>
-        <p:spPr>
-          <a:xfrm>
-            <a:off x="5454502" y="1646238"/>
-            <a:ext cx="377026" cy="369332"/>
-          </a:xfrm>
-          <a:prstGeom prst="rect">
-            <a:avLst/>
-          </a:prstGeom>
-          <a:noFill/>
-        </p:spPr>
-        <p:txBody>
-          <a:bodyPr wrap="none" rtlCol="0">
-            <a:spAutoFit/>
-          </a:bodyPr>
-          <a:lstStyle/>
-          <a:p>
-            <a:r>
-              <a:rPr lang="en-US" dirty="0" err="1">
-                <a:latin typeface="Arial" panose="020B0604020202020204" pitchFamily="34" charset="0"/>
-                <a:cs typeface="Arial" panose="020B0604020202020204" pitchFamily="34" charset="0"/>
-              </a:rPr>
-              <a:t>ttf</a:t>
-            </a:r>
-            <a:endParaRPr lang="en-US" dirty="0">
-              <a:latin typeface="Arial" panose="020B0604020202020204" pitchFamily="34" charset="0"/>
-              <a:cs typeface="Arial" panose="020B0604020202020204" pitchFamily="34" charset="0"/>
-            </a:endParaRPr>
-          </a:p>
-        </p:txBody>
-      </p:sp>
     </p:spTree>
     <p:extLst>
       <p:ext uri="{BB962C8B-B14F-4D97-AF65-F5344CB8AC3E}">

</xml_diff>